<commit_message>
New version of the theory sections with the changes demanded by Denis, Daniel and Patrice.
</commit_message>
<xml_diff>
--- a/material/figures/introduction/bloch_sphere.pptx
+++ b/material/figures/introduction/bloch_sphere.pptx
@@ -288,7 +288,8 @@
           <a:p>
             <a:fld id="{CD24382D-258E-48E6-BA37-B81B0A7FCDAE}" type="datetimeFigureOut">
               <a:rPr lang="de-DE" smtClean="0"/>
-              <a:t>23.05.2012</a:t>
+              <a:pPr/>
+              <a:t>23.07.2012</a:t>
             </a:fld>
             <a:endParaRPr lang="de-DE"/>
           </a:p>
@@ -330,6 +331,7 @@
           <a:p>
             <a:fld id="{E6A8C6CD-BD97-431C-9F93-88495BF9FBC6}" type="slidenum">
               <a:rPr lang="de-DE" smtClean="0"/>
+              <a:pPr/>
               <a:t>‹Nr.›</a:t>
             </a:fld>
             <a:endParaRPr lang="de-DE"/>
@@ -453,7 +455,8 @@
           <a:p>
             <a:fld id="{CD24382D-258E-48E6-BA37-B81B0A7FCDAE}" type="datetimeFigureOut">
               <a:rPr lang="de-DE" smtClean="0"/>
-              <a:t>23.05.2012</a:t>
+              <a:pPr/>
+              <a:t>23.07.2012</a:t>
             </a:fld>
             <a:endParaRPr lang="de-DE"/>
           </a:p>
@@ -495,6 +498,7 @@
           <a:p>
             <a:fld id="{E6A8C6CD-BD97-431C-9F93-88495BF9FBC6}" type="slidenum">
               <a:rPr lang="de-DE" smtClean="0"/>
+              <a:pPr/>
               <a:t>‹Nr.›</a:t>
             </a:fld>
             <a:endParaRPr lang="de-DE"/>
@@ -628,7 +632,8 @@
           <a:p>
             <a:fld id="{CD24382D-258E-48E6-BA37-B81B0A7FCDAE}" type="datetimeFigureOut">
               <a:rPr lang="de-DE" smtClean="0"/>
-              <a:t>23.05.2012</a:t>
+              <a:pPr/>
+              <a:t>23.07.2012</a:t>
             </a:fld>
             <a:endParaRPr lang="de-DE"/>
           </a:p>
@@ -670,6 +675,7 @@
           <a:p>
             <a:fld id="{E6A8C6CD-BD97-431C-9F93-88495BF9FBC6}" type="slidenum">
               <a:rPr lang="de-DE" smtClean="0"/>
+              <a:pPr/>
               <a:t>‹Nr.›</a:t>
             </a:fld>
             <a:endParaRPr lang="de-DE"/>
@@ -793,7 +799,8 @@
           <a:p>
             <a:fld id="{CD24382D-258E-48E6-BA37-B81B0A7FCDAE}" type="datetimeFigureOut">
               <a:rPr lang="de-DE" smtClean="0"/>
-              <a:t>23.05.2012</a:t>
+              <a:pPr/>
+              <a:t>23.07.2012</a:t>
             </a:fld>
             <a:endParaRPr lang="de-DE"/>
           </a:p>
@@ -835,6 +842,7 @@
           <a:p>
             <a:fld id="{E6A8C6CD-BD97-431C-9F93-88495BF9FBC6}" type="slidenum">
               <a:rPr lang="de-DE" smtClean="0"/>
+              <a:pPr/>
               <a:t>‹Nr.›</a:t>
             </a:fld>
             <a:endParaRPr lang="de-DE"/>
@@ -1034,7 +1042,8 @@
           <a:p>
             <a:fld id="{CD24382D-258E-48E6-BA37-B81B0A7FCDAE}" type="datetimeFigureOut">
               <a:rPr lang="de-DE" smtClean="0"/>
-              <a:t>23.05.2012</a:t>
+              <a:pPr/>
+              <a:t>23.07.2012</a:t>
             </a:fld>
             <a:endParaRPr lang="de-DE"/>
           </a:p>
@@ -1076,6 +1085,7 @@
           <a:p>
             <a:fld id="{E6A8C6CD-BD97-431C-9F93-88495BF9FBC6}" type="slidenum">
               <a:rPr lang="de-DE" smtClean="0"/>
+              <a:pPr/>
               <a:t>‹Nr.›</a:t>
             </a:fld>
             <a:endParaRPr lang="de-DE"/>
@@ -1317,7 +1327,8 @@
           <a:p>
             <a:fld id="{CD24382D-258E-48E6-BA37-B81B0A7FCDAE}" type="datetimeFigureOut">
               <a:rPr lang="de-DE" smtClean="0"/>
-              <a:t>23.05.2012</a:t>
+              <a:pPr/>
+              <a:t>23.07.2012</a:t>
             </a:fld>
             <a:endParaRPr lang="de-DE"/>
           </a:p>
@@ -1359,6 +1370,7 @@
           <a:p>
             <a:fld id="{E6A8C6CD-BD97-431C-9F93-88495BF9FBC6}" type="slidenum">
               <a:rPr lang="de-DE" smtClean="0"/>
+              <a:pPr/>
               <a:t>‹Nr.›</a:t>
             </a:fld>
             <a:endParaRPr lang="de-DE"/>
@@ -1734,7 +1746,8 @@
           <a:p>
             <a:fld id="{CD24382D-258E-48E6-BA37-B81B0A7FCDAE}" type="datetimeFigureOut">
               <a:rPr lang="de-DE" smtClean="0"/>
-              <a:t>23.05.2012</a:t>
+              <a:pPr/>
+              <a:t>23.07.2012</a:t>
             </a:fld>
             <a:endParaRPr lang="de-DE"/>
           </a:p>
@@ -1776,6 +1789,7 @@
           <a:p>
             <a:fld id="{E6A8C6CD-BD97-431C-9F93-88495BF9FBC6}" type="slidenum">
               <a:rPr lang="de-DE" smtClean="0"/>
+              <a:pPr/>
               <a:t>‹Nr.›</a:t>
             </a:fld>
             <a:endParaRPr lang="de-DE"/>
@@ -1847,7 +1861,8 @@
           <a:p>
             <a:fld id="{CD24382D-258E-48E6-BA37-B81B0A7FCDAE}" type="datetimeFigureOut">
               <a:rPr lang="de-DE" smtClean="0"/>
-              <a:t>23.05.2012</a:t>
+              <a:pPr/>
+              <a:t>23.07.2012</a:t>
             </a:fld>
             <a:endParaRPr lang="de-DE"/>
           </a:p>
@@ -1889,6 +1904,7 @@
           <a:p>
             <a:fld id="{E6A8C6CD-BD97-431C-9F93-88495BF9FBC6}" type="slidenum">
               <a:rPr lang="de-DE" smtClean="0"/>
+              <a:pPr/>
               <a:t>‹Nr.›</a:t>
             </a:fld>
             <a:endParaRPr lang="de-DE"/>
@@ -1937,7 +1953,8 @@
           <a:p>
             <a:fld id="{CD24382D-258E-48E6-BA37-B81B0A7FCDAE}" type="datetimeFigureOut">
               <a:rPr lang="de-DE" smtClean="0"/>
-              <a:t>23.05.2012</a:t>
+              <a:pPr/>
+              <a:t>23.07.2012</a:t>
             </a:fld>
             <a:endParaRPr lang="de-DE"/>
           </a:p>
@@ -1979,6 +1996,7 @@
           <a:p>
             <a:fld id="{E6A8C6CD-BD97-431C-9F93-88495BF9FBC6}" type="slidenum">
               <a:rPr lang="de-DE" smtClean="0"/>
+              <a:pPr/>
               <a:t>‹Nr.›</a:t>
             </a:fld>
             <a:endParaRPr lang="de-DE"/>
@@ -2209,7 +2227,8 @@
           <a:p>
             <a:fld id="{CD24382D-258E-48E6-BA37-B81B0A7FCDAE}" type="datetimeFigureOut">
               <a:rPr lang="de-DE" smtClean="0"/>
-              <a:t>23.05.2012</a:t>
+              <a:pPr/>
+              <a:t>23.07.2012</a:t>
             </a:fld>
             <a:endParaRPr lang="de-DE"/>
           </a:p>
@@ -2251,6 +2270,7 @@
           <a:p>
             <a:fld id="{E6A8C6CD-BD97-431C-9F93-88495BF9FBC6}" type="slidenum">
               <a:rPr lang="de-DE" smtClean="0"/>
+              <a:pPr/>
               <a:t>‹Nr.›</a:t>
             </a:fld>
             <a:endParaRPr lang="de-DE"/>
@@ -2457,7 +2477,8 @@
           <a:p>
             <a:fld id="{CD24382D-258E-48E6-BA37-B81B0A7FCDAE}" type="datetimeFigureOut">
               <a:rPr lang="de-DE" smtClean="0"/>
-              <a:t>23.05.2012</a:t>
+              <a:pPr/>
+              <a:t>23.07.2012</a:t>
             </a:fld>
             <a:endParaRPr lang="de-DE"/>
           </a:p>
@@ -2499,6 +2520,7 @@
           <a:p>
             <a:fld id="{E6A8C6CD-BD97-431C-9F93-88495BF9FBC6}" type="slidenum">
               <a:rPr lang="de-DE" smtClean="0"/>
+              <a:pPr/>
               <a:t>‹Nr.›</a:t>
             </a:fld>
             <a:endParaRPr lang="de-DE"/>
@@ -2665,7 +2687,8 @@
           <a:p>
             <a:fld id="{CD24382D-258E-48E6-BA37-B81B0A7FCDAE}" type="datetimeFigureOut">
               <a:rPr lang="de-DE" smtClean="0"/>
-              <a:t>23.05.2012</a:t>
+              <a:pPr/>
+              <a:t>23.07.2012</a:t>
             </a:fld>
             <a:endParaRPr lang="de-DE"/>
           </a:p>
@@ -2743,6 +2766,7 @@
           <a:p>
             <a:fld id="{E6A8C6CD-BD97-431C-9F93-88495BF9FBC6}" type="slidenum">
               <a:rPr lang="de-DE" smtClean="0"/>
+              <a:pPr/>
               <a:t>‹Nr.›</a:t>
             </a:fld>
             <a:endParaRPr lang="de-DE"/>
@@ -4051,10 +4075,6 @@
               </a:rPr>
               <a:t>y</a:t>
             </a:r>
-            <a:endParaRPr lang="de-DE" i="1" dirty="0">
-              <a:latin typeface="Times New Roman" pitchFamily="18" charset="0"/>
-              <a:cs typeface="Times New Roman" pitchFamily="18" charset="0"/>
-            </a:endParaRPr>
           </a:p>
         </p:txBody>
       </p:sp>
@@ -4090,6 +4110,78 @@
             <a:endParaRPr lang="de-DE" i="1" dirty="0">
               <a:latin typeface="Times New Roman" pitchFamily="18" charset="0"/>
               <a:cs typeface="Times New Roman" pitchFamily="18" charset="0"/>
+            </a:endParaRPr>
+          </a:p>
+        </p:txBody>
+      </p:sp>
+      <p:sp>
+        <p:nvSpPr>
+          <p:cNvPr id="28" name="Textfeld 27"/>
+          <p:cNvSpPr txBox="1"/>
+          <p:nvPr/>
+        </p:nvSpPr>
+        <p:spPr>
+          <a:xfrm>
+            <a:off x="3635896" y="1484784"/>
+            <a:ext cx="522900" cy="369332"/>
+          </a:xfrm>
+          <a:prstGeom prst="rect">
+            <a:avLst/>
+          </a:prstGeom>
+          <a:noFill/>
+        </p:spPr>
+        <p:txBody>
+          <a:bodyPr wrap="none" rtlCol="0">
+            <a:spAutoFit/>
+          </a:bodyPr>
+          <a:lstStyle/>
+          <a:p>
+            <a:r>
+              <a:rPr lang="de-DE" dirty="0" smtClean="0">
+                <a:latin typeface="Arial" pitchFamily="34" charset="0"/>
+                <a:cs typeface="Arial" pitchFamily="34" charset="0"/>
+              </a:rPr>
+              <a:t>|0&gt;</a:t>
+            </a:r>
+            <a:endParaRPr lang="de-DE" dirty="0">
+              <a:latin typeface="Arial" pitchFamily="34" charset="0"/>
+              <a:cs typeface="Arial" pitchFamily="34" charset="0"/>
+            </a:endParaRPr>
+          </a:p>
+        </p:txBody>
+      </p:sp>
+      <p:sp>
+        <p:nvSpPr>
+          <p:cNvPr id="30" name="Textfeld 29"/>
+          <p:cNvSpPr txBox="1"/>
+          <p:nvPr/>
+        </p:nvSpPr>
+        <p:spPr>
+          <a:xfrm>
+            <a:off x="3617052" y="4293096"/>
+            <a:ext cx="522900" cy="369332"/>
+          </a:xfrm>
+          <a:prstGeom prst="rect">
+            <a:avLst/>
+          </a:prstGeom>
+          <a:noFill/>
+        </p:spPr>
+        <p:txBody>
+          <a:bodyPr wrap="none" rtlCol="0">
+            <a:spAutoFit/>
+          </a:bodyPr>
+          <a:lstStyle/>
+          <a:p>
+            <a:r>
+              <a:rPr lang="de-DE" dirty="0" smtClean="0">
+                <a:latin typeface="Arial" pitchFamily="34" charset="0"/>
+                <a:cs typeface="Arial" pitchFamily="34" charset="0"/>
+              </a:rPr>
+              <a:t>|1&gt;</a:t>
+            </a:r>
+            <a:endParaRPr lang="de-DE" dirty="0">
+              <a:latin typeface="Arial" pitchFamily="34" charset="0"/>
+              <a:cs typeface="Arial" pitchFamily="34" charset="0"/>
             </a:endParaRPr>
           </a:p>
         </p:txBody>

</xml_diff>

<commit_message>
Worked on the theory section.
</commit_message>
<xml_diff>
--- a/material/figures/introduction/bloch_sphere.pptx
+++ b/material/figures/introduction/bloch_sphere.pptx
@@ -6,6 +6,7 @@
   </p:sldMasterIdLst>
   <p:sldIdLst>
     <p:sldId id="256" r:id="rId2"/>
+    <p:sldId id="257" r:id="rId3"/>
   </p:sldIdLst>
   <p:sldSz cx="9144000" cy="6858000" type="screen4x3"/>
   <p:notesSz cx="6858000" cy="9144000"/>
@@ -289,7 +290,7 @@
             <a:fld id="{CD24382D-258E-48E6-BA37-B81B0A7FCDAE}" type="datetimeFigureOut">
               <a:rPr lang="de-DE" smtClean="0"/>
               <a:pPr/>
-              <a:t>23.07.2012</a:t>
+              <a:t>05.08.2012</a:t>
             </a:fld>
             <a:endParaRPr lang="de-DE"/>
           </a:p>
@@ -456,7 +457,7 @@
             <a:fld id="{CD24382D-258E-48E6-BA37-B81B0A7FCDAE}" type="datetimeFigureOut">
               <a:rPr lang="de-DE" smtClean="0"/>
               <a:pPr/>
-              <a:t>23.07.2012</a:t>
+              <a:t>05.08.2012</a:t>
             </a:fld>
             <a:endParaRPr lang="de-DE"/>
           </a:p>
@@ -633,7 +634,7 @@
             <a:fld id="{CD24382D-258E-48E6-BA37-B81B0A7FCDAE}" type="datetimeFigureOut">
               <a:rPr lang="de-DE" smtClean="0"/>
               <a:pPr/>
-              <a:t>23.07.2012</a:t>
+              <a:t>05.08.2012</a:t>
             </a:fld>
             <a:endParaRPr lang="de-DE"/>
           </a:p>
@@ -800,7 +801,7 @@
             <a:fld id="{CD24382D-258E-48E6-BA37-B81B0A7FCDAE}" type="datetimeFigureOut">
               <a:rPr lang="de-DE" smtClean="0"/>
               <a:pPr/>
-              <a:t>23.07.2012</a:t>
+              <a:t>05.08.2012</a:t>
             </a:fld>
             <a:endParaRPr lang="de-DE"/>
           </a:p>
@@ -1043,7 +1044,7 @@
             <a:fld id="{CD24382D-258E-48E6-BA37-B81B0A7FCDAE}" type="datetimeFigureOut">
               <a:rPr lang="de-DE" smtClean="0"/>
               <a:pPr/>
-              <a:t>23.07.2012</a:t>
+              <a:t>05.08.2012</a:t>
             </a:fld>
             <a:endParaRPr lang="de-DE"/>
           </a:p>
@@ -1328,7 +1329,7 @@
             <a:fld id="{CD24382D-258E-48E6-BA37-B81B0A7FCDAE}" type="datetimeFigureOut">
               <a:rPr lang="de-DE" smtClean="0"/>
               <a:pPr/>
-              <a:t>23.07.2012</a:t>
+              <a:t>05.08.2012</a:t>
             </a:fld>
             <a:endParaRPr lang="de-DE"/>
           </a:p>
@@ -1747,7 +1748,7 @@
             <a:fld id="{CD24382D-258E-48E6-BA37-B81B0A7FCDAE}" type="datetimeFigureOut">
               <a:rPr lang="de-DE" smtClean="0"/>
               <a:pPr/>
-              <a:t>23.07.2012</a:t>
+              <a:t>05.08.2012</a:t>
             </a:fld>
             <a:endParaRPr lang="de-DE"/>
           </a:p>
@@ -1862,7 +1863,7 @@
             <a:fld id="{CD24382D-258E-48E6-BA37-B81B0A7FCDAE}" type="datetimeFigureOut">
               <a:rPr lang="de-DE" smtClean="0"/>
               <a:pPr/>
-              <a:t>23.07.2012</a:t>
+              <a:t>05.08.2012</a:t>
             </a:fld>
             <a:endParaRPr lang="de-DE"/>
           </a:p>
@@ -1954,7 +1955,7 @@
             <a:fld id="{CD24382D-258E-48E6-BA37-B81B0A7FCDAE}" type="datetimeFigureOut">
               <a:rPr lang="de-DE" smtClean="0"/>
               <a:pPr/>
-              <a:t>23.07.2012</a:t>
+              <a:t>05.08.2012</a:t>
             </a:fld>
             <a:endParaRPr lang="de-DE"/>
           </a:p>
@@ -2228,7 +2229,7 @@
             <a:fld id="{CD24382D-258E-48E6-BA37-B81B0A7FCDAE}" type="datetimeFigureOut">
               <a:rPr lang="de-DE" smtClean="0"/>
               <a:pPr/>
-              <a:t>23.07.2012</a:t>
+              <a:t>05.08.2012</a:t>
             </a:fld>
             <a:endParaRPr lang="de-DE"/>
           </a:p>
@@ -2478,7 +2479,7 @@
             <a:fld id="{CD24382D-258E-48E6-BA37-B81B0A7FCDAE}" type="datetimeFigureOut">
               <a:rPr lang="de-DE" smtClean="0"/>
               <a:pPr/>
-              <a:t>23.07.2012</a:t>
+              <a:t>05.08.2012</a:t>
             </a:fld>
             <a:endParaRPr lang="de-DE"/>
           </a:p>
@@ -2688,7 +2689,7 @@
             <a:fld id="{CD24382D-258E-48E6-BA37-B81B0A7FCDAE}" type="datetimeFigureOut">
               <a:rPr lang="de-DE" smtClean="0"/>
               <a:pPr/>
-              <a:t>23.07.2012</a:t>
+              <a:t>05.08.2012</a:t>
             </a:fld>
             <a:endParaRPr lang="de-DE"/>
           </a:p>
@@ -3244,8 +3245,8 @@
             <a:solidFill>
               <a:schemeClr val="tx1"/>
             </a:solidFill>
-            <a:headEnd type="none" w="med" len="med"/>
-            <a:tailEnd type="triangle" w="med" len="med"/>
+            <a:headEnd type="triangle" w="med" len="med"/>
+            <a:tailEnd type="none" w="med" len="med"/>
           </a:ln>
         </p:spPr>
         <p:style>
@@ -4018,7 +4019,7 @@
         </p:nvSpPr>
         <p:spPr>
           <a:xfrm>
-            <a:off x="2051720" y="2915652"/>
+            <a:off x="5076830" y="2915652"/>
             <a:ext cx="287258" cy="369332"/>
           </a:xfrm>
           <a:prstGeom prst="rect">
@@ -4075,6 +4076,751 @@
               </a:rPr>
               <a:t>y</a:t>
             </a:r>
+          </a:p>
+        </p:txBody>
+      </p:sp>
+      <p:sp>
+        <p:nvSpPr>
+          <p:cNvPr id="57" name="Textfeld 56"/>
+          <p:cNvSpPr txBox="1"/>
+          <p:nvPr/>
+        </p:nvSpPr>
+        <p:spPr>
+          <a:xfrm>
+            <a:off x="3402949" y="1475492"/>
+            <a:ext cx="274434" cy="369332"/>
+          </a:xfrm>
+          <a:prstGeom prst="rect">
+            <a:avLst/>
+          </a:prstGeom>
+          <a:noFill/>
+        </p:spPr>
+        <p:txBody>
+          <a:bodyPr wrap="none" rtlCol="0">
+            <a:spAutoFit/>
+          </a:bodyPr>
+          <a:lstStyle/>
+          <a:p>
+            <a:r>
+              <a:rPr lang="de-DE" i="1" dirty="0" smtClean="0">
+                <a:latin typeface="Times New Roman" pitchFamily="18" charset="0"/>
+                <a:cs typeface="Times New Roman" pitchFamily="18" charset="0"/>
+              </a:rPr>
+              <a:t>z</a:t>
+            </a:r>
+            <a:endParaRPr lang="de-DE" i="1" dirty="0">
+              <a:latin typeface="Times New Roman" pitchFamily="18" charset="0"/>
+              <a:cs typeface="Times New Roman" pitchFamily="18" charset="0"/>
+            </a:endParaRPr>
+          </a:p>
+        </p:txBody>
+      </p:sp>
+      <p:sp>
+        <p:nvSpPr>
+          <p:cNvPr id="28" name="Textfeld 27"/>
+          <p:cNvSpPr txBox="1"/>
+          <p:nvPr/>
+        </p:nvSpPr>
+        <p:spPr>
+          <a:xfrm>
+            <a:off x="3635896" y="1484784"/>
+            <a:ext cx="522900" cy="369332"/>
+          </a:xfrm>
+          <a:prstGeom prst="rect">
+            <a:avLst/>
+          </a:prstGeom>
+          <a:noFill/>
+        </p:spPr>
+        <p:txBody>
+          <a:bodyPr wrap="none" rtlCol="0">
+            <a:spAutoFit/>
+          </a:bodyPr>
+          <a:lstStyle/>
+          <a:p>
+            <a:r>
+              <a:rPr lang="de-DE" dirty="0" smtClean="0">
+                <a:latin typeface="Arial" pitchFamily="34" charset="0"/>
+                <a:cs typeface="Arial" pitchFamily="34" charset="0"/>
+              </a:rPr>
+              <a:t>|0&gt;</a:t>
+            </a:r>
+            <a:endParaRPr lang="de-DE" dirty="0">
+              <a:latin typeface="Arial" pitchFamily="34" charset="0"/>
+              <a:cs typeface="Arial" pitchFamily="34" charset="0"/>
+            </a:endParaRPr>
+          </a:p>
+        </p:txBody>
+      </p:sp>
+      <p:sp>
+        <p:nvSpPr>
+          <p:cNvPr id="30" name="Textfeld 29"/>
+          <p:cNvSpPr txBox="1"/>
+          <p:nvPr/>
+        </p:nvSpPr>
+        <p:spPr>
+          <a:xfrm>
+            <a:off x="3617052" y="4293096"/>
+            <a:ext cx="522900" cy="369332"/>
+          </a:xfrm>
+          <a:prstGeom prst="rect">
+            <a:avLst/>
+          </a:prstGeom>
+          <a:noFill/>
+        </p:spPr>
+        <p:txBody>
+          <a:bodyPr wrap="none" rtlCol="0">
+            <a:spAutoFit/>
+          </a:bodyPr>
+          <a:lstStyle/>
+          <a:p>
+            <a:r>
+              <a:rPr lang="de-DE" dirty="0" smtClean="0">
+                <a:latin typeface="Arial" pitchFamily="34" charset="0"/>
+                <a:cs typeface="Arial" pitchFamily="34" charset="0"/>
+              </a:rPr>
+              <a:t>|1&gt;</a:t>
+            </a:r>
+            <a:endParaRPr lang="de-DE" dirty="0">
+              <a:latin typeface="Arial" pitchFamily="34" charset="0"/>
+              <a:cs typeface="Arial" pitchFamily="34" charset="0"/>
+            </a:endParaRPr>
+          </a:p>
+        </p:txBody>
+      </p:sp>
+      <p:sp>
+        <p:nvSpPr>
+          <p:cNvPr id="31" name="Textfeld 30"/>
+          <p:cNvSpPr txBox="1"/>
+          <p:nvPr/>
+        </p:nvSpPr>
+        <p:spPr>
+          <a:xfrm>
+            <a:off x="3938803" y="1993951"/>
+            <a:ext cx="595035" cy="369332"/>
+          </a:xfrm>
+          <a:prstGeom prst="rect">
+            <a:avLst/>
+          </a:prstGeom>
+          <a:noFill/>
+        </p:spPr>
+        <p:txBody>
+          <a:bodyPr wrap="none" rtlCol="0">
+            <a:spAutoFit/>
+          </a:bodyPr>
+          <a:lstStyle/>
+          <a:p>
+            <a:r>
+              <a:rPr lang="de-DE" dirty="0" smtClean="0">
+                <a:latin typeface="Arial" pitchFamily="34" charset="0"/>
+                <a:cs typeface="Arial" pitchFamily="34" charset="0"/>
+              </a:rPr>
+              <a:t>|</a:t>
+            </a:r>
+            <a:r>
+              <a:rPr lang="de-DE" dirty="0" smtClean="0">
+                <a:latin typeface="Arial" pitchFamily="34" charset="0"/>
+                <a:cs typeface="Arial" pitchFamily="34" charset="0"/>
+                <a:sym typeface="Symbol"/>
+              </a:rPr>
+              <a:t></a:t>
+            </a:r>
+            <a:r>
+              <a:rPr lang="de-DE" dirty="0" smtClean="0">
+                <a:latin typeface="Arial" pitchFamily="34" charset="0"/>
+                <a:cs typeface="Arial" pitchFamily="34" charset="0"/>
+              </a:rPr>
+              <a:t>&gt;</a:t>
+            </a:r>
+            <a:endParaRPr lang="de-DE" dirty="0">
+              <a:latin typeface="Arial" pitchFamily="34" charset="0"/>
+              <a:cs typeface="Arial" pitchFamily="34" charset="0"/>
+            </a:endParaRPr>
+          </a:p>
+        </p:txBody>
+      </p:sp>
+    </p:spTree>
+  </p:cSld>
+  <p:clrMapOvr>
+    <a:masterClrMapping/>
+  </p:clrMapOvr>
+</p:sld>
+</file>
+
+<file path=ppt/slides/slide2.xml><?xml version="1.0" encoding="utf-8"?>
+<p:sld xmlns:a="http://schemas.openxmlformats.org/drawingml/2006/main" xmlns:r="http://schemas.openxmlformats.org/officeDocument/2006/relationships" xmlns:p="http://schemas.openxmlformats.org/presentationml/2006/main">
+  <p:cSld>
+    <p:spTree>
+      <p:nvGrpSpPr>
+        <p:cNvPr id="1" name=""/>
+        <p:cNvGrpSpPr/>
+        <p:nvPr/>
+      </p:nvGrpSpPr>
+      <p:grpSpPr>
+        <a:xfrm>
+          <a:off x="0" y="0"/>
+          <a:ext cx="0" cy="0"/>
+          <a:chOff x="0" y="0"/>
+          <a:chExt cx="0" cy="0"/>
+        </a:xfrm>
+      </p:grpSpPr>
+      <p:cxnSp>
+        <p:nvCxnSpPr>
+          <p:cNvPr id="32" name="Gerade Verbindung 31"/>
+          <p:cNvCxnSpPr/>
+          <p:nvPr/>
+        </p:nvCxnSpPr>
+        <p:spPr>
+          <a:xfrm>
+            <a:off x="4013866" y="2348880"/>
+            <a:ext cx="0" cy="648072"/>
+          </a:xfrm>
+          <a:prstGeom prst="line">
+            <a:avLst/>
+          </a:prstGeom>
+          <a:ln w="19050">
+            <a:solidFill>
+              <a:srgbClr val="FF0000"/>
+            </a:solidFill>
+            <a:prstDash val="sysDash"/>
+          </a:ln>
+        </p:spPr>
+        <p:style>
+          <a:lnRef idx="1">
+            <a:schemeClr val="accent1"/>
+          </a:lnRef>
+          <a:fillRef idx="0">
+            <a:schemeClr val="accent1"/>
+          </a:fillRef>
+          <a:effectRef idx="0">
+            <a:schemeClr val="accent1"/>
+          </a:effectRef>
+          <a:fontRef idx="minor">
+            <a:schemeClr val="tx1"/>
+          </a:fontRef>
+        </p:style>
+      </p:cxnSp>
+      <p:sp>
+        <p:nvSpPr>
+          <p:cNvPr id="4" name="Ellipse 3"/>
+          <p:cNvSpPr/>
+          <p:nvPr/>
+        </p:nvSpPr>
+        <p:spPr>
+          <a:xfrm>
+            <a:off x="2555776" y="2780928"/>
+            <a:ext cx="2160240" cy="864096"/>
+          </a:xfrm>
+          <a:prstGeom prst="ellipse">
+            <a:avLst/>
+          </a:prstGeom>
+          <a:noFill/>
+          <a:ln w="12700">
+            <a:solidFill>
+              <a:schemeClr val="tx1"/>
+            </a:solidFill>
+            <a:prstDash val="sysDot"/>
+          </a:ln>
+        </p:spPr>
+        <p:style>
+          <a:lnRef idx="2">
+            <a:schemeClr val="accent1">
+              <a:shade val="50000"/>
+            </a:schemeClr>
+          </a:lnRef>
+          <a:fillRef idx="1">
+            <a:schemeClr val="accent1"/>
+          </a:fillRef>
+          <a:effectRef idx="0">
+            <a:schemeClr val="accent1"/>
+          </a:effectRef>
+          <a:fontRef idx="minor">
+            <a:schemeClr val="lt1"/>
+          </a:fontRef>
+        </p:style>
+        <p:txBody>
+          <a:bodyPr rtlCol="0" anchor="ctr"/>
+          <a:lstStyle/>
+          <a:p>
+            <a:pPr algn="ctr"/>
+            <a:endParaRPr lang="de-DE"/>
+          </a:p>
+        </p:txBody>
+      </p:sp>
+      <p:sp>
+        <p:nvSpPr>
+          <p:cNvPr id="5" name="Ellipse 4"/>
+          <p:cNvSpPr/>
+          <p:nvPr/>
+        </p:nvSpPr>
+        <p:spPr>
+          <a:xfrm>
+            <a:off x="3275856" y="2060848"/>
+            <a:ext cx="720080" cy="2232248"/>
+          </a:xfrm>
+          <a:prstGeom prst="ellipse">
+            <a:avLst/>
+          </a:prstGeom>
+          <a:noFill/>
+          <a:ln w="12700">
+            <a:solidFill>
+              <a:schemeClr val="tx1"/>
+            </a:solidFill>
+            <a:prstDash val="sysDot"/>
+          </a:ln>
+        </p:spPr>
+        <p:style>
+          <a:lnRef idx="2">
+            <a:schemeClr val="accent1">
+              <a:shade val="50000"/>
+            </a:schemeClr>
+          </a:lnRef>
+          <a:fillRef idx="1">
+            <a:schemeClr val="accent1"/>
+          </a:fillRef>
+          <a:effectRef idx="0">
+            <a:schemeClr val="accent1"/>
+          </a:effectRef>
+          <a:fontRef idx="minor">
+            <a:schemeClr val="lt1"/>
+          </a:fontRef>
+        </p:style>
+        <p:txBody>
+          <a:bodyPr rtlCol="0" anchor="ctr"/>
+          <a:lstStyle/>
+          <a:p>
+            <a:pPr algn="ctr"/>
+            <a:endParaRPr lang="de-DE"/>
+          </a:p>
+        </p:txBody>
+      </p:sp>
+      <p:cxnSp>
+        <p:nvCxnSpPr>
+          <p:cNvPr id="7" name="Gerade Verbindung 6"/>
+          <p:cNvCxnSpPr/>
+          <p:nvPr/>
+        </p:nvCxnSpPr>
+        <p:spPr>
+          <a:xfrm>
+            <a:off x="2123728" y="3212976"/>
+            <a:ext cx="3240360" cy="0"/>
+          </a:xfrm>
+          <a:prstGeom prst="line">
+            <a:avLst/>
+          </a:prstGeom>
+          <a:ln>
+            <a:solidFill>
+              <a:schemeClr val="tx1"/>
+            </a:solidFill>
+            <a:headEnd type="none" w="med" len="med"/>
+            <a:tailEnd type="triangle" w="med" len="med"/>
+          </a:ln>
+        </p:spPr>
+        <p:style>
+          <a:lnRef idx="1">
+            <a:schemeClr val="accent1"/>
+          </a:lnRef>
+          <a:fillRef idx="0">
+            <a:schemeClr val="accent1"/>
+          </a:fillRef>
+          <a:effectRef idx="0">
+            <a:schemeClr val="accent1"/>
+          </a:effectRef>
+          <a:fontRef idx="minor">
+            <a:schemeClr val="tx1"/>
+          </a:fontRef>
+        </p:style>
+      </p:cxnSp>
+      <p:cxnSp>
+        <p:nvCxnSpPr>
+          <p:cNvPr id="9" name="Gerade Verbindung 8"/>
+          <p:cNvCxnSpPr/>
+          <p:nvPr/>
+        </p:nvCxnSpPr>
+        <p:spPr>
+          <a:xfrm flipV="1">
+            <a:off x="3030650" y="2357718"/>
+            <a:ext cx="1290338" cy="1622614"/>
+          </a:xfrm>
+          <a:prstGeom prst="line">
+            <a:avLst/>
+          </a:prstGeom>
+          <a:ln>
+            <a:solidFill>
+              <a:schemeClr val="tx1"/>
+            </a:solidFill>
+            <a:headEnd type="triangle" w="med" len="med"/>
+            <a:tailEnd type="none" w="med" len="med"/>
+          </a:ln>
+        </p:spPr>
+        <p:style>
+          <a:lnRef idx="1">
+            <a:schemeClr val="accent1"/>
+          </a:lnRef>
+          <a:fillRef idx="0">
+            <a:schemeClr val="accent1"/>
+          </a:fillRef>
+          <a:effectRef idx="0">
+            <a:schemeClr val="accent1"/>
+          </a:effectRef>
+          <a:fontRef idx="minor">
+            <a:schemeClr val="tx1"/>
+          </a:fontRef>
+        </p:style>
+      </p:cxnSp>
+      <p:cxnSp>
+        <p:nvCxnSpPr>
+          <p:cNvPr id="12" name="Gerade Verbindung 11"/>
+          <p:cNvCxnSpPr/>
+          <p:nvPr/>
+        </p:nvCxnSpPr>
+        <p:spPr>
+          <a:xfrm flipV="1">
+            <a:off x="3635896" y="1628800"/>
+            <a:ext cx="0" cy="2880320"/>
+          </a:xfrm>
+          <a:prstGeom prst="line">
+            <a:avLst/>
+          </a:prstGeom>
+          <a:ln>
+            <a:solidFill>
+              <a:schemeClr val="tx1"/>
+            </a:solidFill>
+            <a:headEnd type="none" w="med" len="med"/>
+            <a:tailEnd type="triangle" w="med" len="med"/>
+          </a:ln>
+        </p:spPr>
+        <p:style>
+          <a:lnRef idx="1">
+            <a:schemeClr val="accent1"/>
+          </a:lnRef>
+          <a:fillRef idx="0">
+            <a:schemeClr val="accent1"/>
+          </a:fillRef>
+          <a:effectRef idx="0">
+            <a:schemeClr val="accent1"/>
+          </a:effectRef>
+          <a:fontRef idx="minor">
+            <a:schemeClr val="tx1"/>
+          </a:fontRef>
+        </p:style>
+      </p:cxnSp>
+      <p:sp>
+        <p:nvSpPr>
+          <p:cNvPr id="27" name="Ellipse 26"/>
+          <p:cNvSpPr/>
+          <p:nvPr/>
+        </p:nvSpPr>
+        <p:spPr>
+          <a:xfrm>
+            <a:off x="2555776" y="2060848"/>
+            <a:ext cx="2160240" cy="2232248"/>
+          </a:xfrm>
+          <a:prstGeom prst="ellipse">
+            <a:avLst/>
+          </a:prstGeom>
+          <a:noFill/>
+          <a:ln w="12700">
+            <a:solidFill>
+              <a:schemeClr val="tx1"/>
+            </a:solidFill>
+            <a:prstDash val="sysDot"/>
+          </a:ln>
+        </p:spPr>
+        <p:style>
+          <a:lnRef idx="2">
+            <a:schemeClr val="accent1">
+              <a:shade val="50000"/>
+            </a:schemeClr>
+          </a:lnRef>
+          <a:fillRef idx="1">
+            <a:schemeClr val="accent1"/>
+          </a:fillRef>
+          <a:effectRef idx="0">
+            <a:schemeClr val="accent1"/>
+          </a:effectRef>
+          <a:fontRef idx="minor">
+            <a:schemeClr val="lt1"/>
+          </a:fontRef>
+        </p:style>
+        <p:txBody>
+          <a:bodyPr rtlCol="0" anchor="ctr"/>
+          <a:lstStyle/>
+          <a:p>
+            <a:pPr algn="ctr"/>
+            <a:endParaRPr lang="de-DE"/>
+          </a:p>
+        </p:txBody>
+      </p:sp>
+      <p:cxnSp>
+        <p:nvCxnSpPr>
+          <p:cNvPr id="29" name="Gerade Verbindung mit Pfeil 28"/>
+          <p:cNvCxnSpPr/>
+          <p:nvPr/>
+        </p:nvCxnSpPr>
+        <p:spPr>
+          <a:xfrm flipV="1">
+            <a:off x="3635896" y="2313020"/>
+            <a:ext cx="405444" cy="904746"/>
+          </a:xfrm>
+          <a:prstGeom prst="straightConnector1">
+            <a:avLst/>
+          </a:prstGeom>
+          <a:ln w="38100">
+            <a:solidFill>
+              <a:srgbClr val="FF0000"/>
+            </a:solidFill>
+            <a:headEnd type="oval" w="med" len="med"/>
+            <a:tailEnd type="triangle" w="med" len="med"/>
+          </a:ln>
+        </p:spPr>
+        <p:style>
+          <a:lnRef idx="1">
+            <a:schemeClr val="accent1"/>
+          </a:lnRef>
+          <a:fillRef idx="0">
+            <a:schemeClr val="accent1"/>
+          </a:fillRef>
+          <a:effectRef idx="0">
+            <a:schemeClr val="accent1"/>
+          </a:effectRef>
+          <a:fontRef idx="minor">
+            <a:schemeClr val="tx1"/>
+          </a:fontRef>
+        </p:style>
+      </p:cxnSp>
+      <p:sp>
+        <p:nvSpPr>
+          <p:cNvPr id="50" name="Bogen 49"/>
+          <p:cNvSpPr/>
+          <p:nvPr/>
+        </p:nvSpPr>
+        <p:spPr>
+          <a:xfrm rot="12888337">
+            <a:off x="3048016" y="2328095"/>
+            <a:ext cx="360040" cy="576064"/>
+          </a:xfrm>
+          <a:prstGeom prst="arc">
+            <a:avLst>
+              <a:gd name="adj1" fmla="val 18351433"/>
+              <a:gd name="adj2" fmla="val 2673713"/>
+            </a:avLst>
+          </a:prstGeom>
+        </p:spPr>
+        <p:style>
+          <a:lnRef idx="1">
+            <a:schemeClr val="accent1"/>
+          </a:lnRef>
+          <a:fillRef idx="0">
+            <a:schemeClr val="accent1"/>
+          </a:fillRef>
+          <a:effectRef idx="0">
+            <a:schemeClr val="accent1"/>
+          </a:effectRef>
+          <a:fontRef idx="minor">
+            <a:schemeClr val="tx1"/>
+          </a:fontRef>
+        </p:style>
+        <p:txBody>
+          <a:bodyPr rtlCol="0" anchor="ctr"/>
+          <a:lstStyle/>
+          <a:p>
+            <a:pPr algn="ctr"/>
+            <a:endParaRPr lang="de-DE"/>
+          </a:p>
+        </p:txBody>
+      </p:sp>
+      <p:sp>
+        <p:nvSpPr>
+          <p:cNvPr id="51" name="Bogen 50"/>
+          <p:cNvSpPr/>
+          <p:nvPr/>
+        </p:nvSpPr>
+        <p:spPr>
+          <a:xfrm rot="12888337">
+            <a:off x="3146920" y="2364244"/>
+            <a:ext cx="360040" cy="576064"/>
+          </a:xfrm>
+          <a:prstGeom prst="arc">
+            <a:avLst>
+              <a:gd name="adj1" fmla="val 18351433"/>
+              <a:gd name="adj2" fmla="val 2673713"/>
+            </a:avLst>
+          </a:prstGeom>
+        </p:spPr>
+        <p:style>
+          <a:lnRef idx="1">
+            <a:schemeClr val="accent1"/>
+          </a:lnRef>
+          <a:fillRef idx="0">
+            <a:schemeClr val="accent1"/>
+          </a:fillRef>
+          <a:effectRef idx="0">
+            <a:schemeClr val="accent1"/>
+          </a:effectRef>
+          <a:fontRef idx="minor">
+            <a:schemeClr val="tx1"/>
+          </a:fontRef>
+        </p:style>
+        <p:txBody>
+          <a:bodyPr rtlCol="0" anchor="ctr"/>
+          <a:lstStyle/>
+          <a:p>
+            <a:pPr algn="ctr"/>
+            <a:endParaRPr lang="de-DE"/>
+          </a:p>
+        </p:txBody>
+      </p:sp>
+      <p:sp>
+        <p:nvSpPr>
+          <p:cNvPr id="52" name="Bogen 51"/>
+          <p:cNvSpPr/>
+          <p:nvPr/>
+        </p:nvSpPr>
+        <p:spPr>
+          <a:xfrm rot="17778228">
+            <a:off x="2986110" y="2296585"/>
+            <a:ext cx="244833" cy="678546"/>
+          </a:xfrm>
+          <a:prstGeom prst="arc">
+            <a:avLst>
+              <a:gd name="adj1" fmla="val 18351433"/>
+              <a:gd name="adj2" fmla="val 2673713"/>
+            </a:avLst>
+          </a:prstGeom>
+        </p:spPr>
+        <p:style>
+          <a:lnRef idx="1">
+            <a:schemeClr val="accent1"/>
+          </a:lnRef>
+          <a:fillRef idx="0">
+            <a:schemeClr val="accent1"/>
+          </a:fillRef>
+          <a:effectRef idx="0">
+            <a:schemeClr val="accent1"/>
+          </a:effectRef>
+          <a:fontRef idx="minor">
+            <a:schemeClr val="tx1"/>
+          </a:fontRef>
+        </p:style>
+        <p:txBody>
+          <a:bodyPr rtlCol="0" anchor="ctr"/>
+          <a:lstStyle/>
+          <a:p>
+            <a:pPr algn="ctr"/>
+            <a:endParaRPr lang="de-DE"/>
+          </a:p>
+        </p:txBody>
+      </p:sp>
+      <p:sp>
+        <p:nvSpPr>
+          <p:cNvPr id="54" name="Bogen 53"/>
+          <p:cNvSpPr/>
+          <p:nvPr/>
+        </p:nvSpPr>
+        <p:spPr>
+          <a:xfrm rot="17778228">
+            <a:off x="2926801" y="2386812"/>
+            <a:ext cx="244833" cy="678546"/>
+          </a:xfrm>
+          <a:prstGeom prst="arc">
+            <a:avLst>
+              <a:gd name="adj1" fmla="val 18351433"/>
+              <a:gd name="adj2" fmla="val 2673713"/>
+            </a:avLst>
+          </a:prstGeom>
+        </p:spPr>
+        <p:style>
+          <a:lnRef idx="1">
+            <a:schemeClr val="accent1"/>
+          </a:lnRef>
+          <a:fillRef idx="0">
+            <a:schemeClr val="accent1"/>
+          </a:fillRef>
+          <a:effectRef idx="0">
+            <a:schemeClr val="accent1"/>
+          </a:effectRef>
+          <a:fontRef idx="minor">
+            <a:schemeClr val="tx1"/>
+          </a:fontRef>
+        </p:style>
+        <p:txBody>
+          <a:bodyPr rtlCol="0" anchor="ctr"/>
+          <a:lstStyle/>
+          <a:p>
+            <a:pPr algn="ctr"/>
+            <a:endParaRPr lang="de-DE"/>
+          </a:p>
+        </p:txBody>
+      </p:sp>
+      <p:sp>
+        <p:nvSpPr>
+          <p:cNvPr id="55" name="Textfeld 54"/>
+          <p:cNvSpPr txBox="1"/>
+          <p:nvPr/>
+        </p:nvSpPr>
+        <p:spPr>
+          <a:xfrm>
+            <a:off x="2051720" y="2915652"/>
+            <a:ext cx="287258" cy="369332"/>
+          </a:xfrm>
+          <a:prstGeom prst="rect">
+            <a:avLst/>
+          </a:prstGeom>
+          <a:noFill/>
+        </p:spPr>
+        <p:txBody>
+          <a:bodyPr wrap="none" rtlCol="0">
+            <a:spAutoFit/>
+          </a:bodyPr>
+          <a:lstStyle/>
+          <a:p>
+            <a:r>
+              <a:rPr lang="de-DE" i="1" dirty="0" smtClean="0">
+                <a:latin typeface="Times New Roman" pitchFamily="18" charset="0"/>
+                <a:cs typeface="Times New Roman" pitchFamily="18" charset="0"/>
+              </a:rPr>
+              <a:t>y</a:t>
+            </a:r>
+            <a:endParaRPr lang="de-DE" i="1" dirty="0">
+              <a:latin typeface="Times New Roman" pitchFamily="18" charset="0"/>
+              <a:cs typeface="Times New Roman" pitchFamily="18" charset="0"/>
+            </a:endParaRPr>
+          </a:p>
+        </p:txBody>
+      </p:sp>
+      <p:sp>
+        <p:nvSpPr>
+          <p:cNvPr id="56" name="Textfeld 55"/>
+          <p:cNvSpPr txBox="1"/>
+          <p:nvPr/>
+        </p:nvSpPr>
+        <p:spPr>
+          <a:xfrm>
+            <a:off x="2916590" y="3573016"/>
+            <a:ext cx="287258" cy="369332"/>
+          </a:xfrm>
+          <a:prstGeom prst="rect">
+            <a:avLst/>
+          </a:prstGeom>
+          <a:noFill/>
+        </p:spPr>
+        <p:txBody>
+          <a:bodyPr wrap="none" rtlCol="0">
+            <a:spAutoFit/>
+          </a:bodyPr>
+          <a:lstStyle/>
+          <a:p>
+            <a:r>
+              <a:rPr lang="de-DE" i="1" dirty="0" smtClean="0">
+                <a:latin typeface="Times New Roman" pitchFamily="18" charset="0"/>
+                <a:cs typeface="Times New Roman" pitchFamily="18" charset="0"/>
+              </a:rPr>
+              <a:t>x</a:t>
+            </a:r>
+            <a:endParaRPr lang="de-DE" i="1" dirty="0">
+              <a:latin typeface="Times New Roman" pitchFamily="18" charset="0"/>
+              <a:cs typeface="Times New Roman" pitchFamily="18" charset="0"/>
+            </a:endParaRPr>
           </a:p>
         </p:txBody>
       </p:sp>

</xml_diff>

<commit_message>
Next iteration of the processor design chapter.
</commit_message>
<xml_diff>
--- a/material/figures/introduction/bloch_sphere.pptx
+++ b/material/figures/introduction/bloch_sphere.pptx
@@ -290,7 +290,7 @@
             <a:fld id="{CD24382D-258E-48E6-BA37-B81B0A7FCDAE}" type="datetimeFigureOut">
               <a:rPr lang="de-DE" smtClean="0"/>
               <a:pPr/>
-              <a:t>05.08.2012</a:t>
+              <a:t>08.08.2012</a:t>
             </a:fld>
             <a:endParaRPr lang="de-DE"/>
           </a:p>
@@ -457,7 +457,7 @@
             <a:fld id="{CD24382D-258E-48E6-BA37-B81B0A7FCDAE}" type="datetimeFigureOut">
               <a:rPr lang="de-DE" smtClean="0"/>
               <a:pPr/>
-              <a:t>05.08.2012</a:t>
+              <a:t>08.08.2012</a:t>
             </a:fld>
             <a:endParaRPr lang="de-DE"/>
           </a:p>
@@ -634,7 +634,7 @@
             <a:fld id="{CD24382D-258E-48E6-BA37-B81B0A7FCDAE}" type="datetimeFigureOut">
               <a:rPr lang="de-DE" smtClean="0"/>
               <a:pPr/>
-              <a:t>05.08.2012</a:t>
+              <a:t>08.08.2012</a:t>
             </a:fld>
             <a:endParaRPr lang="de-DE"/>
           </a:p>
@@ -801,7 +801,7 @@
             <a:fld id="{CD24382D-258E-48E6-BA37-B81B0A7FCDAE}" type="datetimeFigureOut">
               <a:rPr lang="de-DE" smtClean="0"/>
               <a:pPr/>
-              <a:t>05.08.2012</a:t>
+              <a:t>08.08.2012</a:t>
             </a:fld>
             <a:endParaRPr lang="de-DE"/>
           </a:p>
@@ -1044,7 +1044,7 @@
             <a:fld id="{CD24382D-258E-48E6-BA37-B81B0A7FCDAE}" type="datetimeFigureOut">
               <a:rPr lang="de-DE" smtClean="0"/>
               <a:pPr/>
-              <a:t>05.08.2012</a:t>
+              <a:t>08.08.2012</a:t>
             </a:fld>
             <a:endParaRPr lang="de-DE"/>
           </a:p>
@@ -1329,7 +1329,7 @@
             <a:fld id="{CD24382D-258E-48E6-BA37-B81B0A7FCDAE}" type="datetimeFigureOut">
               <a:rPr lang="de-DE" smtClean="0"/>
               <a:pPr/>
-              <a:t>05.08.2012</a:t>
+              <a:t>08.08.2012</a:t>
             </a:fld>
             <a:endParaRPr lang="de-DE"/>
           </a:p>
@@ -1748,7 +1748,7 @@
             <a:fld id="{CD24382D-258E-48E6-BA37-B81B0A7FCDAE}" type="datetimeFigureOut">
               <a:rPr lang="de-DE" smtClean="0"/>
               <a:pPr/>
-              <a:t>05.08.2012</a:t>
+              <a:t>08.08.2012</a:t>
             </a:fld>
             <a:endParaRPr lang="de-DE"/>
           </a:p>
@@ -1863,7 +1863,7 @@
             <a:fld id="{CD24382D-258E-48E6-BA37-B81B0A7FCDAE}" type="datetimeFigureOut">
               <a:rPr lang="de-DE" smtClean="0"/>
               <a:pPr/>
-              <a:t>05.08.2012</a:t>
+              <a:t>08.08.2012</a:t>
             </a:fld>
             <a:endParaRPr lang="de-DE"/>
           </a:p>
@@ -1955,7 +1955,7 @@
             <a:fld id="{CD24382D-258E-48E6-BA37-B81B0A7FCDAE}" type="datetimeFigureOut">
               <a:rPr lang="de-DE" smtClean="0"/>
               <a:pPr/>
-              <a:t>05.08.2012</a:t>
+              <a:t>08.08.2012</a:t>
             </a:fld>
             <a:endParaRPr lang="de-DE"/>
           </a:p>
@@ -2229,7 +2229,7 @@
             <a:fld id="{CD24382D-258E-48E6-BA37-B81B0A7FCDAE}" type="datetimeFigureOut">
               <a:rPr lang="de-DE" smtClean="0"/>
               <a:pPr/>
-              <a:t>05.08.2012</a:t>
+              <a:t>08.08.2012</a:t>
             </a:fld>
             <a:endParaRPr lang="de-DE"/>
           </a:p>
@@ -2479,7 +2479,7 @@
             <a:fld id="{CD24382D-258E-48E6-BA37-B81B0A7FCDAE}" type="datetimeFigureOut">
               <a:rPr lang="de-DE" smtClean="0"/>
               <a:pPr/>
-              <a:t>05.08.2012</a:t>
+              <a:t>08.08.2012</a:t>
             </a:fld>
             <a:endParaRPr lang="de-DE"/>
           </a:p>
@@ -2689,7 +2689,7 @@
             <a:fld id="{CD24382D-258E-48E6-BA37-B81B0A7FCDAE}" type="datetimeFigureOut">
               <a:rPr lang="de-DE" smtClean="0"/>
               <a:pPr/>
-              <a:t>05.08.2012</a:t>
+              <a:t>08.08.2012</a:t>
             </a:fld>
             <a:endParaRPr lang="de-DE"/>
           </a:p>
@@ -4271,7 +4271,7 @@
         </p:nvCxnSpPr>
         <p:spPr>
           <a:xfrm>
-            <a:off x="4013866" y="2348880"/>
+            <a:off x="4482843" y="4086364"/>
             <a:ext cx="0" cy="648072"/>
           </a:xfrm>
           <a:prstGeom prst="line">
@@ -4307,7 +4307,7 @@
         </p:nvSpPr>
         <p:spPr>
           <a:xfrm>
-            <a:off x="2555776" y="2780928"/>
+            <a:off x="2571678" y="4293096"/>
             <a:ext cx="2160240" cy="864096"/>
           </a:xfrm>
           <a:prstGeom prst="ellipse">
@@ -4354,7 +4354,7 @@
         </p:nvSpPr>
         <p:spPr>
           <a:xfrm>
-            <a:off x="3275856" y="2060848"/>
+            <a:off x="3291758" y="3573016"/>
             <a:ext cx="720080" cy="2232248"/>
           </a:xfrm>
           <a:prstGeom prst="ellipse">
@@ -4401,8 +4401,8 @@
         </p:nvCxnSpPr>
         <p:spPr>
           <a:xfrm>
-            <a:off x="2123728" y="3212976"/>
-            <a:ext cx="3240360" cy="0"/>
+            <a:off x="2361786" y="4736161"/>
+            <a:ext cx="2752206" cy="0"/>
           </a:xfrm>
           <a:prstGeom prst="line">
             <a:avLst/>
@@ -4412,7 +4412,7 @@
               <a:schemeClr val="tx1"/>
             </a:solidFill>
             <a:headEnd type="none" w="med" len="med"/>
-            <a:tailEnd type="triangle" w="med" len="med"/>
+            <a:tailEnd type="none" w="med" len="med"/>
           </a:ln>
         </p:spPr>
         <p:style>
@@ -4438,7 +4438,7 @@
         </p:nvCxnSpPr>
         <p:spPr>
           <a:xfrm flipV="1">
-            <a:off x="3030650" y="2357718"/>
+            <a:off x="3059506" y="3869886"/>
             <a:ext cx="1290338" cy="1622614"/>
           </a:xfrm>
           <a:prstGeom prst="line">
@@ -4475,8 +4475,495 @@
         </p:nvCxnSpPr>
         <p:spPr>
           <a:xfrm flipV="1">
-            <a:off x="3635896" y="1628800"/>
+            <a:off x="3651798" y="3140968"/>
             <a:ext cx="0" cy="2880320"/>
+          </a:xfrm>
+          <a:prstGeom prst="line">
+            <a:avLst/>
+          </a:prstGeom>
+          <a:ln>
+            <a:solidFill>
+              <a:schemeClr val="tx1"/>
+            </a:solidFill>
+            <a:headEnd type="none" w="med" len="med"/>
+            <a:tailEnd type="none" w="med" len="med"/>
+          </a:ln>
+        </p:spPr>
+        <p:style>
+          <a:lnRef idx="1">
+            <a:schemeClr val="accent1"/>
+          </a:lnRef>
+          <a:fillRef idx="0">
+            <a:schemeClr val="accent1"/>
+          </a:fillRef>
+          <a:effectRef idx="0">
+            <a:schemeClr val="accent1"/>
+          </a:effectRef>
+          <a:fontRef idx="minor">
+            <a:schemeClr val="tx1"/>
+          </a:fontRef>
+        </p:style>
+      </p:cxnSp>
+      <p:sp>
+        <p:nvSpPr>
+          <p:cNvPr id="27" name="Ellipse 26"/>
+          <p:cNvSpPr/>
+          <p:nvPr/>
+        </p:nvSpPr>
+        <p:spPr>
+          <a:xfrm>
+            <a:off x="2571678" y="3573016"/>
+            <a:ext cx="2160240" cy="2232248"/>
+          </a:xfrm>
+          <a:prstGeom prst="ellipse">
+            <a:avLst/>
+          </a:prstGeom>
+          <a:noFill/>
+          <a:ln w="12700">
+            <a:solidFill>
+              <a:schemeClr val="tx1"/>
+            </a:solidFill>
+            <a:prstDash val="sysDot"/>
+          </a:ln>
+        </p:spPr>
+        <p:style>
+          <a:lnRef idx="2">
+            <a:schemeClr val="accent1">
+              <a:shade val="50000"/>
+            </a:schemeClr>
+          </a:lnRef>
+          <a:fillRef idx="1">
+            <a:schemeClr val="accent1"/>
+          </a:fillRef>
+          <a:effectRef idx="0">
+            <a:schemeClr val="accent1"/>
+          </a:effectRef>
+          <a:fontRef idx="minor">
+            <a:schemeClr val="lt1"/>
+          </a:fontRef>
+        </p:style>
+        <p:txBody>
+          <a:bodyPr rtlCol="0" anchor="ctr"/>
+          <a:lstStyle/>
+          <a:p>
+            <a:pPr algn="ctr"/>
+            <a:endParaRPr lang="de-DE"/>
+          </a:p>
+        </p:txBody>
+      </p:sp>
+      <p:cxnSp>
+        <p:nvCxnSpPr>
+          <p:cNvPr id="29" name="Gerade Verbindung mit Pfeil 28"/>
+          <p:cNvCxnSpPr/>
+          <p:nvPr/>
+        </p:nvCxnSpPr>
+        <p:spPr>
+          <a:xfrm flipV="1">
+            <a:off x="3651798" y="4026932"/>
+            <a:ext cx="836952" cy="703002"/>
+          </a:xfrm>
+          <a:prstGeom prst="straightConnector1">
+            <a:avLst/>
+          </a:prstGeom>
+          <a:ln w="38100">
+            <a:solidFill>
+              <a:srgbClr val="FF0000"/>
+            </a:solidFill>
+            <a:headEnd type="oval" w="med" len="med"/>
+            <a:tailEnd type="triangle" w="med" len="med"/>
+          </a:ln>
+        </p:spPr>
+        <p:style>
+          <a:lnRef idx="1">
+            <a:schemeClr val="accent1"/>
+          </a:lnRef>
+          <a:fillRef idx="0">
+            <a:schemeClr val="accent1"/>
+          </a:fillRef>
+          <a:effectRef idx="0">
+            <a:schemeClr val="accent1"/>
+          </a:effectRef>
+          <a:fontRef idx="minor">
+            <a:schemeClr val="tx1"/>
+          </a:fontRef>
+        </p:style>
+      </p:cxnSp>
+      <p:sp>
+        <p:nvSpPr>
+          <p:cNvPr id="50" name="Bogen 49"/>
+          <p:cNvSpPr/>
+          <p:nvPr/>
+        </p:nvSpPr>
+        <p:spPr>
+          <a:xfrm rot="12888337">
+            <a:off x="3063918" y="3840263"/>
+            <a:ext cx="360040" cy="576064"/>
+          </a:xfrm>
+          <a:prstGeom prst="arc">
+            <a:avLst>
+              <a:gd name="adj1" fmla="val 18351433"/>
+              <a:gd name="adj2" fmla="val 2673713"/>
+            </a:avLst>
+          </a:prstGeom>
+        </p:spPr>
+        <p:style>
+          <a:lnRef idx="1">
+            <a:schemeClr val="accent1"/>
+          </a:lnRef>
+          <a:fillRef idx="0">
+            <a:schemeClr val="accent1"/>
+          </a:fillRef>
+          <a:effectRef idx="0">
+            <a:schemeClr val="accent1"/>
+          </a:effectRef>
+          <a:fontRef idx="minor">
+            <a:schemeClr val="tx1"/>
+          </a:fontRef>
+        </p:style>
+        <p:txBody>
+          <a:bodyPr rtlCol="0" anchor="ctr"/>
+          <a:lstStyle/>
+          <a:p>
+            <a:pPr algn="ctr"/>
+            <a:endParaRPr lang="de-DE"/>
+          </a:p>
+        </p:txBody>
+      </p:sp>
+      <p:sp>
+        <p:nvSpPr>
+          <p:cNvPr id="51" name="Bogen 50"/>
+          <p:cNvSpPr/>
+          <p:nvPr/>
+        </p:nvSpPr>
+        <p:spPr>
+          <a:xfrm rot="12888337">
+            <a:off x="3162822" y="3876412"/>
+            <a:ext cx="360040" cy="576064"/>
+          </a:xfrm>
+          <a:prstGeom prst="arc">
+            <a:avLst>
+              <a:gd name="adj1" fmla="val 18351433"/>
+              <a:gd name="adj2" fmla="val 2673713"/>
+            </a:avLst>
+          </a:prstGeom>
+        </p:spPr>
+        <p:style>
+          <a:lnRef idx="1">
+            <a:schemeClr val="accent1"/>
+          </a:lnRef>
+          <a:fillRef idx="0">
+            <a:schemeClr val="accent1"/>
+          </a:fillRef>
+          <a:effectRef idx="0">
+            <a:schemeClr val="accent1"/>
+          </a:effectRef>
+          <a:fontRef idx="minor">
+            <a:schemeClr val="tx1"/>
+          </a:fontRef>
+        </p:style>
+        <p:txBody>
+          <a:bodyPr rtlCol="0" anchor="ctr"/>
+          <a:lstStyle/>
+          <a:p>
+            <a:pPr algn="ctr"/>
+            <a:endParaRPr lang="de-DE"/>
+          </a:p>
+        </p:txBody>
+      </p:sp>
+      <p:sp>
+        <p:nvSpPr>
+          <p:cNvPr id="52" name="Bogen 51"/>
+          <p:cNvSpPr/>
+          <p:nvPr/>
+        </p:nvSpPr>
+        <p:spPr>
+          <a:xfrm rot="17778228">
+            <a:off x="3002012" y="3808753"/>
+            <a:ext cx="244833" cy="678546"/>
+          </a:xfrm>
+          <a:prstGeom prst="arc">
+            <a:avLst>
+              <a:gd name="adj1" fmla="val 18351433"/>
+              <a:gd name="adj2" fmla="val 2673713"/>
+            </a:avLst>
+          </a:prstGeom>
+        </p:spPr>
+        <p:style>
+          <a:lnRef idx="1">
+            <a:schemeClr val="accent1"/>
+          </a:lnRef>
+          <a:fillRef idx="0">
+            <a:schemeClr val="accent1"/>
+          </a:fillRef>
+          <a:effectRef idx="0">
+            <a:schemeClr val="accent1"/>
+          </a:effectRef>
+          <a:fontRef idx="minor">
+            <a:schemeClr val="tx1"/>
+          </a:fontRef>
+        </p:style>
+        <p:txBody>
+          <a:bodyPr rtlCol="0" anchor="ctr"/>
+          <a:lstStyle/>
+          <a:p>
+            <a:pPr algn="ctr"/>
+            <a:endParaRPr lang="de-DE"/>
+          </a:p>
+        </p:txBody>
+      </p:sp>
+      <p:sp>
+        <p:nvSpPr>
+          <p:cNvPr id="54" name="Bogen 53"/>
+          <p:cNvSpPr/>
+          <p:nvPr/>
+        </p:nvSpPr>
+        <p:spPr>
+          <a:xfrm rot="17778228">
+            <a:off x="2942703" y="3898980"/>
+            <a:ext cx="244833" cy="678546"/>
+          </a:xfrm>
+          <a:prstGeom prst="arc">
+            <a:avLst>
+              <a:gd name="adj1" fmla="val 18351433"/>
+              <a:gd name="adj2" fmla="val 2673713"/>
+            </a:avLst>
+          </a:prstGeom>
+        </p:spPr>
+        <p:style>
+          <a:lnRef idx="1">
+            <a:schemeClr val="accent1"/>
+          </a:lnRef>
+          <a:fillRef idx="0">
+            <a:schemeClr val="accent1"/>
+          </a:fillRef>
+          <a:effectRef idx="0">
+            <a:schemeClr val="accent1"/>
+          </a:effectRef>
+          <a:fontRef idx="minor">
+            <a:schemeClr val="tx1"/>
+          </a:fontRef>
+        </p:style>
+        <p:txBody>
+          <a:bodyPr rtlCol="0" anchor="ctr"/>
+          <a:lstStyle/>
+          <a:p>
+            <a:pPr algn="ctr"/>
+            <a:endParaRPr lang="de-DE"/>
+          </a:p>
+        </p:txBody>
+      </p:sp>
+      <p:sp>
+        <p:nvSpPr>
+          <p:cNvPr id="56" name="Textfeld 55"/>
+          <p:cNvSpPr txBox="1"/>
+          <p:nvPr/>
+        </p:nvSpPr>
+        <p:spPr>
+          <a:xfrm>
+            <a:off x="2877407" y="4867435"/>
+            <a:ext cx="343364" cy="523220"/>
+          </a:xfrm>
+          <a:prstGeom prst="rect">
+            <a:avLst/>
+          </a:prstGeom>
+          <a:noFill/>
+        </p:spPr>
+        <p:txBody>
+          <a:bodyPr wrap="none" rtlCol="0">
+            <a:spAutoFit/>
+          </a:bodyPr>
+          <a:lstStyle/>
+          <a:p>
+            <a:r>
+              <a:rPr lang="de-DE" sz="2800" i="1" dirty="0" smtClean="0">
+                <a:latin typeface="Times New Roman" pitchFamily="18" charset="0"/>
+                <a:cs typeface="Times New Roman" pitchFamily="18" charset="0"/>
+              </a:rPr>
+              <a:t>y</a:t>
+            </a:r>
+            <a:endParaRPr lang="de-DE" sz="2800" i="1" dirty="0">
+              <a:latin typeface="Times New Roman" pitchFamily="18" charset="0"/>
+              <a:cs typeface="Times New Roman" pitchFamily="18" charset="0"/>
+            </a:endParaRPr>
+          </a:p>
+        </p:txBody>
+      </p:sp>
+      <p:sp>
+        <p:nvSpPr>
+          <p:cNvPr id="28" name="Textfeld 27"/>
+          <p:cNvSpPr txBox="1"/>
+          <p:nvPr/>
+        </p:nvSpPr>
+        <p:spPr>
+          <a:xfrm>
+            <a:off x="3640781" y="3020678"/>
+            <a:ext cx="686406" cy="400110"/>
+          </a:xfrm>
+          <a:prstGeom prst="rect">
+            <a:avLst/>
+          </a:prstGeom>
+          <a:noFill/>
+        </p:spPr>
+        <p:txBody>
+          <a:bodyPr wrap="none" rtlCol="0">
+            <a:spAutoFit/>
+          </a:bodyPr>
+          <a:lstStyle/>
+          <a:p>
+            <a:r>
+              <a:rPr lang="de-DE" sz="2000" dirty="0" smtClean="0">
+                <a:latin typeface="Arial" pitchFamily="34" charset="0"/>
+                <a:cs typeface="Arial" pitchFamily="34" charset="0"/>
+              </a:rPr>
+              <a:t>|01&gt;</a:t>
+            </a:r>
+            <a:endParaRPr lang="de-DE" sz="2000" dirty="0">
+              <a:latin typeface="Arial" pitchFamily="34" charset="0"/>
+              <a:cs typeface="Arial" pitchFamily="34" charset="0"/>
+            </a:endParaRPr>
+          </a:p>
+        </p:txBody>
+      </p:sp>
+      <p:sp>
+        <p:nvSpPr>
+          <p:cNvPr id="30" name="Textfeld 29"/>
+          <p:cNvSpPr txBox="1"/>
+          <p:nvPr/>
+        </p:nvSpPr>
+        <p:spPr>
+          <a:xfrm>
+            <a:off x="3621937" y="5816862"/>
+            <a:ext cx="686406" cy="400110"/>
+          </a:xfrm>
+          <a:prstGeom prst="rect">
+            <a:avLst/>
+          </a:prstGeom>
+          <a:noFill/>
+        </p:spPr>
+        <p:txBody>
+          <a:bodyPr wrap="none" rtlCol="0">
+            <a:spAutoFit/>
+          </a:bodyPr>
+          <a:lstStyle/>
+          <a:p>
+            <a:r>
+              <a:rPr lang="de-DE" sz="2000" dirty="0" smtClean="0">
+                <a:latin typeface="Arial" pitchFamily="34" charset="0"/>
+                <a:cs typeface="Arial" pitchFamily="34" charset="0"/>
+              </a:rPr>
+              <a:t>|10&gt;</a:t>
+            </a:r>
+            <a:endParaRPr lang="de-DE" sz="2000" dirty="0">
+              <a:latin typeface="Arial" pitchFamily="34" charset="0"/>
+              <a:cs typeface="Arial" pitchFamily="34" charset="0"/>
+            </a:endParaRPr>
+          </a:p>
+        </p:txBody>
+      </p:sp>
+      <p:sp>
+        <p:nvSpPr>
+          <p:cNvPr id="19" name="Ellipse 18"/>
+          <p:cNvSpPr/>
+          <p:nvPr/>
+        </p:nvSpPr>
+        <p:spPr>
+          <a:xfrm>
+            <a:off x="2571678" y="722328"/>
+            <a:ext cx="2160240" cy="2232248"/>
+          </a:xfrm>
+          <a:prstGeom prst="ellipse">
+            <a:avLst/>
+          </a:prstGeom>
+          <a:noFill/>
+          <a:ln w="12700">
+            <a:solidFill>
+              <a:schemeClr val="tx1"/>
+            </a:solidFill>
+            <a:prstDash val="sysDot"/>
+          </a:ln>
+        </p:spPr>
+        <p:style>
+          <a:lnRef idx="2">
+            <a:schemeClr val="accent1">
+              <a:shade val="50000"/>
+            </a:schemeClr>
+          </a:lnRef>
+          <a:fillRef idx="1">
+            <a:schemeClr val="accent1"/>
+          </a:fillRef>
+          <a:effectRef idx="0">
+            <a:schemeClr val="accent1"/>
+          </a:effectRef>
+          <a:fontRef idx="minor">
+            <a:schemeClr val="lt1"/>
+          </a:fontRef>
+        </p:style>
+        <p:txBody>
+          <a:bodyPr rtlCol="0" anchor="ctr"/>
+          <a:lstStyle/>
+          <a:p>
+            <a:pPr algn="ctr"/>
+            <a:endParaRPr lang="de-DE"/>
+          </a:p>
+        </p:txBody>
+      </p:sp>
+      <p:sp>
+        <p:nvSpPr>
+          <p:cNvPr id="20" name="Ellipse 19"/>
+          <p:cNvSpPr/>
+          <p:nvPr/>
+        </p:nvSpPr>
+        <p:spPr>
+          <a:xfrm>
+            <a:off x="5524006" y="3571291"/>
+            <a:ext cx="2160240" cy="2232248"/>
+          </a:xfrm>
+          <a:prstGeom prst="ellipse">
+            <a:avLst/>
+          </a:prstGeom>
+          <a:noFill/>
+          <a:ln w="12700">
+            <a:solidFill>
+              <a:schemeClr val="tx1"/>
+            </a:solidFill>
+            <a:prstDash val="sysDot"/>
+          </a:ln>
+        </p:spPr>
+        <p:style>
+          <a:lnRef idx="2">
+            <a:schemeClr val="accent1">
+              <a:shade val="50000"/>
+            </a:schemeClr>
+          </a:lnRef>
+          <a:fillRef idx="1">
+            <a:schemeClr val="accent1"/>
+          </a:fillRef>
+          <a:effectRef idx="0">
+            <a:schemeClr val="accent1"/>
+          </a:effectRef>
+          <a:fontRef idx="minor">
+            <a:schemeClr val="lt1"/>
+          </a:fontRef>
+        </p:style>
+        <p:txBody>
+          <a:bodyPr rtlCol="0" anchor="ctr"/>
+          <a:lstStyle/>
+          <a:p>
+            <a:pPr algn="ctr"/>
+            <a:endParaRPr lang="de-DE"/>
+          </a:p>
+        </p:txBody>
+      </p:sp>
+      <p:cxnSp>
+        <p:nvCxnSpPr>
+          <p:cNvPr id="21" name="Gerade Verbindung 20"/>
+          <p:cNvCxnSpPr/>
+          <p:nvPr/>
+        </p:nvCxnSpPr>
+        <p:spPr>
+          <a:xfrm>
+            <a:off x="2355654" y="1802448"/>
+            <a:ext cx="2664296" cy="0"/>
           </a:xfrm>
           <a:prstGeom prst="line">
             <a:avLst/>
@@ -4504,26 +4991,395 @@
           </a:fontRef>
         </p:style>
       </p:cxnSp>
-      <p:sp>
-        <p:nvSpPr>
-          <p:cNvPr id="27" name="Ellipse 26"/>
-          <p:cNvSpPr/>
-          <p:nvPr/>
-        </p:nvSpPr>
-        <p:spPr>
-          <a:xfrm>
-            <a:off x="2555776" y="2060848"/>
-            <a:ext cx="2160240" cy="2232248"/>
-          </a:xfrm>
-          <a:prstGeom prst="ellipse">
+      <p:cxnSp>
+        <p:nvCxnSpPr>
+          <p:cNvPr id="22" name="Gerade Verbindung 21"/>
+          <p:cNvCxnSpPr/>
+          <p:nvPr/>
+        </p:nvCxnSpPr>
+        <p:spPr>
+          <a:xfrm flipV="1">
+            <a:off x="3651798" y="506304"/>
+            <a:ext cx="0" cy="2880320"/>
+          </a:xfrm>
+          <a:prstGeom prst="line">
             <a:avLst/>
           </a:prstGeom>
-          <a:noFill/>
-          <a:ln w="12700">
+          <a:ln>
             <a:solidFill>
               <a:schemeClr val="tx1"/>
             </a:solidFill>
-            <a:prstDash val="sysDot"/>
+            <a:headEnd type="none" w="med" len="med"/>
+            <a:tailEnd type="triangle" w="med" len="med"/>
+          </a:ln>
+        </p:spPr>
+        <p:style>
+          <a:lnRef idx="1">
+            <a:schemeClr val="accent1"/>
+          </a:lnRef>
+          <a:fillRef idx="0">
+            <a:schemeClr val="accent1"/>
+          </a:fillRef>
+          <a:effectRef idx="0">
+            <a:schemeClr val="accent1"/>
+          </a:effectRef>
+          <a:fontRef idx="minor">
+            <a:schemeClr val="tx1"/>
+          </a:fontRef>
+        </p:style>
+      </p:cxnSp>
+      <p:cxnSp>
+        <p:nvCxnSpPr>
+          <p:cNvPr id="23" name="Gerade Verbindung 22"/>
+          <p:cNvCxnSpPr/>
+          <p:nvPr/>
+        </p:nvCxnSpPr>
+        <p:spPr>
+          <a:xfrm>
+            <a:off x="5069924" y="4734436"/>
+            <a:ext cx="2880320" cy="0"/>
+          </a:xfrm>
+          <a:prstGeom prst="line">
+            <a:avLst/>
+          </a:prstGeom>
+          <a:ln>
+            <a:solidFill>
+              <a:schemeClr val="tx1"/>
+            </a:solidFill>
+            <a:headEnd type="none" w="med" len="med"/>
+            <a:tailEnd type="triangle" w="med" len="med"/>
+          </a:ln>
+        </p:spPr>
+        <p:style>
+          <a:lnRef idx="1">
+            <a:schemeClr val="accent1"/>
+          </a:lnRef>
+          <a:fillRef idx="0">
+            <a:schemeClr val="accent1"/>
+          </a:fillRef>
+          <a:effectRef idx="0">
+            <a:schemeClr val="accent1"/>
+          </a:effectRef>
+          <a:fontRef idx="minor">
+            <a:schemeClr val="tx1"/>
+          </a:fontRef>
+        </p:style>
+      </p:cxnSp>
+      <p:cxnSp>
+        <p:nvCxnSpPr>
+          <p:cNvPr id="24" name="Gerade Verbindung 23"/>
+          <p:cNvCxnSpPr/>
+          <p:nvPr/>
+        </p:nvCxnSpPr>
+        <p:spPr>
+          <a:xfrm flipV="1">
+            <a:off x="6604126" y="3366284"/>
+            <a:ext cx="0" cy="2592288"/>
+          </a:xfrm>
+          <a:prstGeom prst="line">
+            <a:avLst/>
+          </a:prstGeom>
+          <a:ln>
+            <a:solidFill>
+              <a:schemeClr val="tx1"/>
+            </a:solidFill>
+            <a:headEnd type="none" w="med" len="med"/>
+            <a:tailEnd type="triangle" w="med" len="med"/>
+          </a:ln>
+        </p:spPr>
+        <p:style>
+          <a:lnRef idx="1">
+            <a:schemeClr val="accent1"/>
+          </a:lnRef>
+          <a:fillRef idx="0">
+            <a:schemeClr val="accent1"/>
+          </a:fillRef>
+          <a:effectRef idx="0">
+            <a:schemeClr val="accent1"/>
+          </a:effectRef>
+          <a:fontRef idx="minor">
+            <a:schemeClr val="tx1"/>
+          </a:fontRef>
+        </p:style>
+      </p:cxnSp>
+      <p:sp>
+        <p:nvSpPr>
+          <p:cNvPr id="38" name="Textfeld 37"/>
+          <p:cNvSpPr txBox="1"/>
+          <p:nvPr/>
+        </p:nvSpPr>
+        <p:spPr>
+          <a:xfrm>
+            <a:off x="7685020" y="4169389"/>
+            <a:ext cx="343364" cy="523220"/>
+          </a:xfrm>
+          <a:prstGeom prst="rect">
+            <a:avLst/>
+          </a:prstGeom>
+          <a:noFill/>
+        </p:spPr>
+        <p:txBody>
+          <a:bodyPr wrap="none" rtlCol="0">
+            <a:spAutoFit/>
+          </a:bodyPr>
+          <a:lstStyle/>
+          <a:p>
+            <a:r>
+              <a:rPr lang="de-DE" sz="2800" i="1" dirty="0" smtClean="0">
+                <a:latin typeface="Times New Roman" pitchFamily="18" charset="0"/>
+                <a:cs typeface="Times New Roman" pitchFamily="18" charset="0"/>
+              </a:rPr>
+              <a:t>x</a:t>
+            </a:r>
+            <a:endParaRPr lang="de-DE" sz="2800" i="1" dirty="0">
+              <a:latin typeface="Times New Roman" pitchFamily="18" charset="0"/>
+              <a:cs typeface="Times New Roman" pitchFamily="18" charset="0"/>
+            </a:endParaRPr>
+          </a:p>
+        </p:txBody>
+      </p:sp>
+      <p:sp>
+        <p:nvSpPr>
+          <p:cNvPr id="39" name="Textfeld 38"/>
+          <p:cNvSpPr txBox="1"/>
+          <p:nvPr/>
+        </p:nvSpPr>
+        <p:spPr>
+          <a:xfrm>
+            <a:off x="6649215" y="3060813"/>
+            <a:ext cx="343364" cy="523220"/>
+          </a:xfrm>
+          <a:prstGeom prst="rect">
+            <a:avLst/>
+          </a:prstGeom>
+          <a:noFill/>
+        </p:spPr>
+        <p:txBody>
+          <a:bodyPr wrap="none" rtlCol="0">
+            <a:spAutoFit/>
+          </a:bodyPr>
+          <a:lstStyle/>
+          <a:p>
+            <a:r>
+              <a:rPr lang="de-DE" sz="2800" i="1" dirty="0" smtClean="0">
+                <a:latin typeface="Times New Roman" pitchFamily="18" charset="0"/>
+                <a:cs typeface="Times New Roman" pitchFamily="18" charset="0"/>
+              </a:rPr>
+              <a:t>y</a:t>
+            </a:r>
+            <a:endParaRPr lang="de-DE" sz="2800" i="1" dirty="0">
+              <a:latin typeface="Times New Roman" pitchFamily="18" charset="0"/>
+              <a:cs typeface="Times New Roman" pitchFamily="18" charset="0"/>
+            </a:endParaRPr>
+          </a:p>
+        </p:txBody>
+      </p:sp>
+      <p:sp>
+        <p:nvSpPr>
+          <p:cNvPr id="40" name="Textfeld 39"/>
+          <p:cNvSpPr txBox="1"/>
+          <p:nvPr/>
+        </p:nvSpPr>
+        <p:spPr>
+          <a:xfrm>
+            <a:off x="4748841" y="1244102"/>
+            <a:ext cx="343364" cy="523220"/>
+          </a:xfrm>
+          <a:prstGeom prst="rect">
+            <a:avLst/>
+          </a:prstGeom>
+          <a:noFill/>
+        </p:spPr>
+        <p:txBody>
+          <a:bodyPr wrap="none" rtlCol="0">
+            <a:spAutoFit/>
+          </a:bodyPr>
+          <a:lstStyle/>
+          <a:p>
+            <a:r>
+              <a:rPr lang="de-DE" sz="2800" i="1" dirty="0" smtClean="0">
+                <a:latin typeface="Times New Roman" pitchFamily="18" charset="0"/>
+                <a:cs typeface="Times New Roman" pitchFamily="18" charset="0"/>
+              </a:rPr>
+              <a:t>x</a:t>
+            </a:r>
+            <a:endParaRPr lang="de-DE" sz="2800" i="1" dirty="0">
+              <a:latin typeface="Times New Roman" pitchFamily="18" charset="0"/>
+              <a:cs typeface="Times New Roman" pitchFamily="18" charset="0"/>
+            </a:endParaRPr>
+          </a:p>
+        </p:txBody>
+      </p:sp>
+      <p:sp>
+        <p:nvSpPr>
+          <p:cNvPr id="41" name="Textfeld 40"/>
+          <p:cNvSpPr txBox="1"/>
+          <p:nvPr/>
+        </p:nvSpPr>
+        <p:spPr>
+          <a:xfrm>
+            <a:off x="3671808" y="241484"/>
+            <a:ext cx="324128" cy="523220"/>
+          </a:xfrm>
+          <a:prstGeom prst="rect">
+            <a:avLst/>
+          </a:prstGeom>
+          <a:noFill/>
+        </p:spPr>
+        <p:txBody>
+          <a:bodyPr wrap="none" rtlCol="0">
+            <a:spAutoFit/>
+          </a:bodyPr>
+          <a:lstStyle/>
+          <a:p>
+            <a:r>
+              <a:rPr lang="de-DE" sz="2800" i="1" dirty="0" smtClean="0">
+                <a:latin typeface="Times New Roman" pitchFamily="18" charset="0"/>
+                <a:cs typeface="Times New Roman" pitchFamily="18" charset="0"/>
+              </a:rPr>
+              <a:t>z</a:t>
+            </a:r>
+            <a:endParaRPr lang="de-DE" sz="2800" i="1" dirty="0">
+              <a:latin typeface="Times New Roman" pitchFamily="18" charset="0"/>
+              <a:cs typeface="Times New Roman" pitchFamily="18" charset="0"/>
+            </a:endParaRPr>
+          </a:p>
+        </p:txBody>
+      </p:sp>
+      <p:cxnSp>
+        <p:nvCxnSpPr>
+          <p:cNvPr id="43" name="Gerade Verbindung mit Pfeil 42"/>
+          <p:cNvCxnSpPr/>
+          <p:nvPr/>
+        </p:nvCxnSpPr>
+        <p:spPr>
+          <a:xfrm flipV="1">
+            <a:off x="3651798" y="938352"/>
+            <a:ext cx="0" cy="864096"/>
+          </a:xfrm>
+          <a:prstGeom prst="straightConnector1">
+            <a:avLst/>
+          </a:prstGeom>
+          <a:ln w="28575">
+            <a:solidFill>
+              <a:srgbClr val="FF0000"/>
+            </a:solidFill>
+            <a:prstDash val="sysDash"/>
+            <a:headEnd type="none" w="med" len="med"/>
+            <a:tailEnd type="triangle" w="med" len="med"/>
+          </a:ln>
+        </p:spPr>
+        <p:style>
+          <a:lnRef idx="1">
+            <a:schemeClr val="accent1"/>
+          </a:lnRef>
+          <a:fillRef idx="0">
+            <a:schemeClr val="accent1"/>
+          </a:fillRef>
+          <a:effectRef idx="0">
+            <a:schemeClr val="accent1"/>
+          </a:effectRef>
+          <a:fontRef idx="minor">
+            <a:schemeClr val="tx1"/>
+          </a:fontRef>
+        </p:style>
+      </p:cxnSp>
+      <p:cxnSp>
+        <p:nvCxnSpPr>
+          <p:cNvPr id="44" name="Gerade Verbindung mit Pfeil 43"/>
+          <p:cNvCxnSpPr/>
+          <p:nvPr/>
+        </p:nvCxnSpPr>
+        <p:spPr>
+          <a:xfrm flipV="1">
+            <a:off x="3651798" y="973566"/>
+            <a:ext cx="660682" cy="828883"/>
+          </a:xfrm>
+          <a:prstGeom prst="straightConnector1">
+            <a:avLst/>
+          </a:prstGeom>
+          <a:ln w="28575">
+            <a:solidFill>
+              <a:srgbClr val="FF0000"/>
+            </a:solidFill>
+            <a:headEnd type="none" w="med" len="med"/>
+            <a:tailEnd type="triangle" w="med" len="med"/>
+          </a:ln>
+        </p:spPr>
+        <p:style>
+          <a:lnRef idx="1">
+            <a:schemeClr val="accent1"/>
+          </a:lnRef>
+          <a:fillRef idx="0">
+            <a:schemeClr val="accent1"/>
+          </a:fillRef>
+          <a:effectRef idx="0">
+            <a:schemeClr val="accent1"/>
+          </a:effectRef>
+          <a:fontRef idx="minor">
+            <a:schemeClr val="tx1"/>
+          </a:fontRef>
+        </p:style>
+      </p:cxnSp>
+      <p:cxnSp>
+        <p:nvCxnSpPr>
+          <p:cNvPr id="58" name="Gerade Verbindung 57"/>
+          <p:cNvCxnSpPr>
+            <a:stCxn id="19" idx="0"/>
+          </p:cNvCxnSpPr>
+          <p:nvPr/>
+        </p:nvCxnSpPr>
+        <p:spPr>
+          <a:xfrm>
+            <a:off x="3651798" y="722328"/>
+            <a:ext cx="1008112" cy="792088"/>
+          </a:xfrm>
+          <a:prstGeom prst="line">
+            <a:avLst/>
+          </a:prstGeom>
+          <a:ln w="19050">
+            <a:solidFill>
+              <a:schemeClr val="bg1">
+                <a:lumMod val="50000"/>
+              </a:schemeClr>
+            </a:solidFill>
+            <a:prstDash val="dash"/>
+          </a:ln>
+        </p:spPr>
+        <p:style>
+          <a:lnRef idx="1">
+            <a:schemeClr val="accent1"/>
+          </a:lnRef>
+          <a:fillRef idx="0">
+            <a:schemeClr val="accent1"/>
+          </a:fillRef>
+          <a:effectRef idx="0">
+            <a:schemeClr val="accent1"/>
+          </a:effectRef>
+          <a:fontRef idx="minor">
+            <a:schemeClr val="tx1"/>
+          </a:fontRef>
+        </p:style>
+      </p:cxnSp>
+      <p:sp>
+        <p:nvSpPr>
+          <p:cNvPr id="60" name="Ellipse 59"/>
+          <p:cNvSpPr/>
+          <p:nvPr/>
+        </p:nvSpPr>
+        <p:spPr>
+          <a:xfrm>
+            <a:off x="6510084" y="4623471"/>
+            <a:ext cx="216024" cy="216024"/>
+          </a:xfrm>
+          <a:prstGeom prst="ellipse">
+            <a:avLst/>
+          </a:prstGeom>
+          <a:solidFill>
+            <a:srgbClr val="FF0000"/>
+          </a:solidFill>
+          <a:ln>
+            <a:noFill/>
           </a:ln>
         </p:spPr>
         <p:style>
@@ -4553,23 +5409,23 @@
       </p:sp>
       <p:cxnSp>
         <p:nvCxnSpPr>
-          <p:cNvPr id="29" name="Gerade Verbindung mit Pfeil 28"/>
+          <p:cNvPr id="61" name="Gerade Verbindung mit Pfeil 60"/>
           <p:cNvCxnSpPr/>
           <p:nvPr/>
         </p:nvCxnSpPr>
         <p:spPr>
-          <a:xfrm flipV="1">
-            <a:off x="3635896" y="2313020"/>
-            <a:ext cx="405444" cy="904746"/>
+          <a:xfrm>
+            <a:off x="6565169" y="4731483"/>
+            <a:ext cx="886130" cy="2953"/>
           </a:xfrm>
           <a:prstGeom prst="straightConnector1">
             <a:avLst/>
           </a:prstGeom>
-          <a:ln w="38100">
+          <a:ln w="28575">
             <a:solidFill>
               <a:srgbClr val="FF0000"/>
             </a:solidFill>
-            <a:headEnd type="oval" w="med" len="med"/>
+            <a:headEnd type="none" w="med" len="med"/>
             <a:tailEnd type="triangle" w="med" len="med"/>
           </a:ln>
         </p:spPr>
@@ -4590,21 +5446,233 @@
       </p:cxnSp>
       <p:sp>
         <p:nvSpPr>
-          <p:cNvPr id="50" name="Bogen 49"/>
+          <p:cNvPr id="71" name="Ellipse 70"/>
           <p:cNvSpPr/>
           <p:nvPr/>
         </p:nvSpPr>
         <p:spPr>
-          <a:xfrm rot="12888337">
-            <a:off x="3048016" y="2328095"/>
-            <a:ext cx="360040" cy="576064"/>
-          </a:xfrm>
-          <a:prstGeom prst="arc">
-            <a:avLst>
-              <a:gd name="adj1" fmla="val 18351433"/>
-              <a:gd name="adj2" fmla="val 2673713"/>
-            </a:avLst>
-          </a:prstGeom>
+          <a:xfrm>
+            <a:off x="6604125" y="4086364"/>
+            <a:ext cx="837145" cy="1296144"/>
+          </a:xfrm>
+          <a:prstGeom prst="ellipse">
+            <a:avLst/>
+          </a:prstGeom>
+          <a:noFill/>
+          <a:ln>
+            <a:solidFill>
+              <a:schemeClr val="bg1">
+                <a:lumMod val="50000"/>
+              </a:schemeClr>
+            </a:solidFill>
+            <a:prstDash val="dash"/>
+          </a:ln>
+        </p:spPr>
+        <p:style>
+          <a:lnRef idx="2">
+            <a:schemeClr val="accent1">
+              <a:shade val="50000"/>
+            </a:schemeClr>
+          </a:lnRef>
+          <a:fillRef idx="1">
+            <a:schemeClr val="accent1"/>
+          </a:fillRef>
+          <a:effectRef idx="0">
+            <a:schemeClr val="accent1"/>
+          </a:effectRef>
+          <a:fontRef idx="minor">
+            <a:schemeClr val="lt1"/>
+          </a:fontRef>
+        </p:style>
+        <p:txBody>
+          <a:bodyPr rtlCol="0" anchor="ctr"/>
+          <a:lstStyle/>
+          <a:p>
+            <a:pPr algn="ctr"/>
+            <a:endParaRPr lang="de-DE"/>
+          </a:p>
+        </p:txBody>
+      </p:sp>
+      <p:grpSp>
+        <p:nvGrpSpPr>
+          <p:cNvPr id="45" name="Gruppieren 44"/>
+          <p:cNvGrpSpPr/>
+          <p:nvPr/>
+        </p:nvGrpSpPr>
+        <p:grpSpPr>
+          <a:xfrm>
+            <a:off x="3214266" y="919188"/>
+            <a:ext cx="415498" cy="800235"/>
+            <a:chOff x="3198364" y="529516"/>
+            <a:chExt cx="415498" cy="800235"/>
+          </a:xfrm>
+        </p:grpSpPr>
+        <p:sp>
+          <p:nvSpPr>
+            <p:cNvPr id="35" name="Textfeld 34"/>
+            <p:cNvSpPr txBox="1"/>
+            <p:nvPr/>
+          </p:nvSpPr>
+          <p:spPr>
+            <a:xfrm>
+              <a:off x="3198364" y="529516"/>
+              <a:ext cx="415498" cy="523220"/>
+            </a:xfrm>
+            <a:prstGeom prst="rect">
+              <a:avLst/>
+            </a:prstGeom>
+            <a:noFill/>
+          </p:spPr>
+          <p:txBody>
+            <a:bodyPr wrap="none" rtlCol="0">
+              <a:spAutoFit/>
+            </a:bodyPr>
+            <a:lstStyle/>
+            <a:p>
+              <a:r>
+                <a:rPr lang="de-DE" sz="2800" dirty="0" smtClean="0">
+                  <a:latin typeface="Times New Roman" pitchFamily="18" charset="0"/>
+                  <a:cs typeface="Times New Roman" pitchFamily="18" charset="0"/>
+                </a:rPr>
+                <a:t>Δ</a:t>
+              </a:r>
+              <a:endParaRPr lang="de-DE" sz="2800" dirty="0">
+                <a:latin typeface="Times New Roman" pitchFamily="18" charset="0"/>
+                <a:cs typeface="Times New Roman" pitchFamily="18" charset="0"/>
+              </a:endParaRPr>
+            </a:p>
+          </p:txBody>
+        </p:sp>
+        <p:cxnSp>
+          <p:nvCxnSpPr>
+            <p:cNvPr id="37" name="Gerade Verbindung 36"/>
+            <p:cNvCxnSpPr/>
+            <p:nvPr/>
+          </p:nvCxnSpPr>
+          <p:spPr>
+            <a:xfrm>
+              <a:off x="3270372" y="983598"/>
+              <a:ext cx="288032" cy="0"/>
+            </a:xfrm>
+            <a:prstGeom prst="line">
+              <a:avLst/>
+            </a:prstGeom>
+            <a:ln>
+              <a:solidFill>
+                <a:schemeClr val="tx1"/>
+              </a:solidFill>
+            </a:ln>
+          </p:spPr>
+          <p:style>
+            <a:lnRef idx="1">
+              <a:schemeClr val="accent1"/>
+            </a:lnRef>
+            <a:fillRef idx="0">
+              <a:schemeClr val="accent1"/>
+            </a:fillRef>
+            <a:effectRef idx="0">
+              <a:schemeClr val="accent1"/>
+            </a:effectRef>
+            <a:fontRef idx="minor">
+              <a:schemeClr val="tx1"/>
+            </a:fontRef>
+          </p:style>
+        </p:cxnSp>
+        <p:sp>
+          <p:nvSpPr>
+            <p:cNvPr id="42" name="Textfeld 41"/>
+            <p:cNvSpPr txBox="1"/>
+            <p:nvPr/>
+          </p:nvSpPr>
+          <p:spPr>
+            <a:xfrm>
+              <a:off x="3231415" y="806531"/>
+              <a:ext cx="364202" cy="523220"/>
+            </a:xfrm>
+            <a:prstGeom prst="rect">
+              <a:avLst/>
+            </a:prstGeom>
+            <a:noFill/>
+          </p:spPr>
+          <p:txBody>
+            <a:bodyPr wrap="none" rtlCol="0">
+              <a:spAutoFit/>
+            </a:bodyPr>
+            <a:lstStyle/>
+            <a:p>
+              <a:r>
+                <a:rPr lang="de-DE" sz="2800" dirty="0" smtClean="0">
+                  <a:latin typeface="Times New Roman" pitchFamily="18" charset="0"/>
+                  <a:cs typeface="Times New Roman" pitchFamily="18" charset="0"/>
+                </a:rPr>
+                <a:t>g</a:t>
+              </a:r>
+              <a:endParaRPr lang="de-DE" sz="2800" dirty="0">
+                <a:latin typeface="Times New Roman" pitchFamily="18" charset="0"/>
+                <a:cs typeface="Times New Roman" pitchFamily="18" charset="0"/>
+              </a:endParaRPr>
+            </a:p>
+          </p:txBody>
+        </p:sp>
+      </p:grpSp>
+      <p:sp>
+        <p:nvSpPr>
+          <p:cNvPr id="46" name="Textfeld 45"/>
+          <p:cNvSpPr txBox="1"/>
+          <p:nvPr/>
+        </p:nvSpPr>
+        <p:spPr>
+          <a:xfrm>
+            <a:off x="2975786" y="1063204"/>
+            <a:ext cx="372218" cy="523220"/>
+          </a:xfrm>
+          <a:prstGeom prst="rect">
+            <a:avLst/>
+          </a:prstGeom>
+          <a:noFill/>
+        </p:spPr>
+        <p:txBody>
+          <a:bodyPr wrap="none" rtlCol="0">
+            <a:spAutoFit/>
+          </a:bodyPr>
+          <a:lstStyle/>
+          <a:p>
+            <a:r>
+              <a:rPr lang="el-GR" sz="2800" dirty="0" smtClean="0">
+                <a:latin typeface="Times New Roman" pitchFamily="18" charset="0"/>
+                <a:cs typeface="Times New Roman" pitchFamily="18" charset="0"/>
+              </a:rPr>
+              <a:t>α</a:t>
+            </a:r>
+            <a:endParaRPr lang="de-DE" sz="2800" dirty="0">
+              <a:latin typeface="Times New Roman" pitchFamily="18" charset="0"/>
+              <a:cs typeface="Times New Roman" pitchFamily="18" charset="0"/>
+            </a:endParaRPr>
+          </a:p>
+        </p:txBody>
+      </p:sp>
+      <p:cxnSp>
+        <p:nvCxnSpPr>
+          <p:cNvPr id="47" name="Gerade Verbindung mit Pfeil 46"/>
+          <p:cNvCxnSpPr/>
+          <p:nvPr/>
+        </p:nvCxnSpPr>
+        <p:spPr>
+          <a:xfrm flipV="1">
+            <a:off x="3651798" y="4014356"/>
+            <a:ext cx="0" cy="720080"/>
+          </a:xfrm>
+          <a:prstGeom prst="straightConnector1">
+            <a:avLst/>
+          </a:prstGeom>
+          <a:ln w="28575">
+            <a:solidFill>
+              <a:srgbClr val="FF0000"/>
+            </a:solidFill>
+            <a:prstDash val="sysDash"/>
+            <a:headEnd type="none" w="med" len="med"/>
+            <a:tailEnd type="triangle" w="med" len="med"/>
+          </a:ln>
         </p:spPr>
         <p:style>
           <a:lnRef idx="1">
@@ -4620,318 +5688,7 @@
             <a:schemeClr val="tx1"/>
           </a:fontRef>
         </p:style>
-        <p:txBody>
-          <a:bodyPr rtlCol="0" anchor="ctr"/>
-          <a:lstStyle/>
-          <a:p>
-            <a:pPr algn="ctr"/>
-            <a:endParaRPr lang="de-DE"/>
-          </a:p>
-        </p:txBody>
-      </p:sp>
-      <p:sp>
-        <p:nvSpPr>
-          <p:cNvPr id="51" name="Bogen 50"/>
-          <p:cNvSpPr/>
-          <p:nvPr/>
-        </p:nvSpPr>
-        <p:spPr>
-          <a:xfrm rot="12888337">
-            <a:off x="3146920" y="2364244"/>
-            <a:ext cx="360040" cy="576064"/>
-          </a:xfrm>
-          <a:prstGeom prst="arc">
-            <a:avLst>
-              <a:gd name="adj1" fmla="val 18351433"/>
-              <a:gd name="adj2" fmla="val 2673713"/>
-            </a:avLst>
-          </a:prstGeom>
-        </p:spPr>
-        <p:style>
-          <a:lnRef idx="1">
-            <a:schemeClr val="accent1"/>
-          </a:lnRef>
-          <a:fillRef idx="0">
-            <a:schemeClr val="accent1"/>
-          </a:fillRef>
-          <a:effectRef idx="0">
-            <a:schemeClr val="accent1"/>
-          </a:effectRef>
-          <a:fontRef idx="minor">
-            <a:schemeClr val="tx1"/>
-          </a:fontRef>
-        </p:style>
-        <p:txBody>
-          <a:bodyPr rtlCol="0" anchor="ctr"/>
-          <a:lstStyle/>
-          <a:p>
-            <a:pPr algn="ctr"/>
-            <a:endParaRPr lang="de-DE"/>
-          </a:p>
-        </p:txBody>
-      </p:sp>
-      <p:sp>
-        <p:nvSpPr>
-          <p:cNvPr id="52" name="Bogen 51"/>
-          <p:cNvSpPr/>
-          <p:nvPr/>
-        </p:nvSpPr>
-        <p:spPr>
-          <a:xfrm rot="17778228">
-            <a:off x="2986110" y="2296585"/>
-            <a:ext cx="244833" cy="678546"/>
-          </a:xfrm>
-          <a:prstGeom prst="arc">
-            <a:avLst>
-              <a:gd name="adj1" fmla="val 18351433"/>
-              <a:gd name="adj2" fmla="val 2673713"/>
-            </a:avLst>
-          </a:prstGeom>
-        </p:spPr>
-        <p:style>
-          <a:lnRef idx="1">
-            <a:schemeClr val="accent1"/>
-          </a:lnRef>
-          <a:fillRef idx="0">
-            <a:schemeClr val="accent1"/>
-          </a:fillRef>
-          <a:effectRef idx="0">
-            <a:schemeClr val="accent1"/>
-          </a:effectRef>
-          <a:fontRef idx="minor">
-            <a:schemeClr val="tx1"/>
-          </a:fontRef>
-        </p:style>
-        <p:txBody>
-          <a:bodyPr rtlCol="0" anchor="ctr"/>
-          <a:lstStyle/>
-          <a:p>
-            <a:pPr algn="ctr"/>
-            <a:endParaRPr lang="de-DE"/>
-          </a:p>
-        </p:txBody>
-      </p:sp>
-      <p:sp>
-        <p:nvSpPr>
-          <p:cNvPr id="54" name="Bogen 53"/>
-          <p:cNvSpPr/>
-          <p:nvPr/>
-        </p:nvSpPr>
-        <p:spPr>
-          <a:xfrm rot="17778228">
-            <a:off x="2926801" y="2386812"/>
-            <a:ext cx="244833" cy="678546"/>
-          </a:xfrm>
-          <a:prstGeom prst="arc">
-            <a:avLst>
-              <a:gd name="adj1" fmla="val 18351433"/>
-              <a:gd name="adj2" fmla="val 2673713"/>
-            </a:avLst>
-          </a:prstGeom>
-        </p:spPr>
-        <p:style>
-          <a:lnRef idx="1">
-            <a:schemeClr val="accent1"/>
-          </a:lnRef>
-          <a:fillRef idx="0">
-            <a:schemeClr val="accent1"/>
-          </a:fillRef>
-          <a:effectRef idx="0">
-            <a:schemeClr val="accent1"/>
-          </a:effectRef>
-          <a:fontRef idx="minor">
-            <a:schemeClr val="tx1"/>
-          </a:fontRef>
-        </p:style>
-        <p:txBody>
-          <a:bodyPr rtlCol="0" anchor="ctr"/>
-          <a:lstStyle/>
-          <a:p>
-            <a:pPr algn="ctr"/>
-            <a:endParaRPr lang="de-DE"/>
-          </a:p>
-        </p:txBody>
-      </p:sp>
-      <p:sp>
-        <p:nvSpPr>
-          <p:cNvPr id="55" name="Textfeld 54"/>
-          <p:cNvSpPr txBox="1"/>
-          <p:nvPr/>
-        </p:nvSpPr>
-        <p:spPr>
-          <a:xfrm>
-            <a:off x="2051720" y="2915652"/>
-            <a:ext cx="287258" cy="369332"/>
-          </a:xfrm>
-          <a:prstGeom prst="rect">
-            <a:avLst/>
-          </a:prstGeom>
-          <a:noFill/>
-        </p:spPr>
-        <p:txBody>
-          <a:bodyPr wrap="none" rtlCol="0">
-            <a:spAutoFit/>
-          </a:bodyPr>
-          <a:lstStyle/>
-          <a:p>
-            <a:r>
-              <a:rPr lang="de-DE" i="1" dirty="0" smtClean="0">
-                <a:latin typeface="Times New Roman" pitchFamily="18" charset="0"/>
-                <a:cs typeface="Times New Roman" pitchFamily="18" charset="0"/>
-              </a:rPr>
-              <a:t>y</a:t>
-            </a:r>
-            <a:endParaRPr lang="de-DE" i="1" dirty="0">
-              <a:latin typeface="Times New Roman" pitchFamily="18" charset="0"/>
-              <a:cs typeface="Times New Roman" pitchFamily="18" charset="0"/>
-            </a:endParaRPr>
-          </a:p>
-        </p:txBody>
-      </p:sp>
-      <p:sp>
-        <p:nvSpPr>
-          <p:cNvPr id="56" name="Textfeld 55"/>
-          <p:cNvSpPr txBox="1"/>
-          <p:nvPr/>
-        </p:nvSpPr>
-        <p:spPr>
-          <a:xfrm>
-            <a:off x="2916590" y="3573016"/>
-            <a:ext cx="287258" cy="369332"/>
-          </a:xfrm>
-          <a:prstGeom prst="rect">
-            <a:avLst/>
-          </a:prstGeom>
-          <a:noFill/>
-        </p:spPr>
-        <p:txBody>
-          <a:bodyPr wrap="none" rtlCol="0">
-            <a:spAutoFit/>
-          </a:bodyPr>
-          <a:lstStyle/>
-          <a:p>
-            <a:r>
-              <a:rPr lang="de-DE" i="1" dirty="0" smtClean="0">
-                <a:latin typeface="Times New Roman" pitchFamily="18" charset="0"/>
-                <a:cs typeface="Times New Roman" pitchFamily="18" charset="0"/>
-              </a:rPr>
-              <a:t>x</a:t>
-            </a:r>
-            <a:endParaRPr lang="de-DE" i="1" dirty="0">
-              <a:latin typeface="Times New Roman" pitchFamily="18" charset="0"/>
-              <a:cs typeface="Times New Roman" pitchFamily="18" charset="0"/>
-            </a:endParaRPr>
-          </a:p>
-        </p:txBody>
-      </p:sp>
-      <p:sp>
-        <p:nvSpPr>
-          <p:cNvPr id="57" name="Textfeld 56"/>
-          <p:cNvSpPr txBox="1"/>
-          <p:nvPr/>
-        </p:nvSpPr>
-        <p:spPr>
-          <a:xfrm>
-            <a:off x="3419872" y="4221088"/>
-            <a:ext cx="274434" cy="369332"/>
-          </a:xfrm>
-          <a:prstGeom prst="rect">
-            <a:avLst/>
-          </a:prstGeom>
-          <a:noFill/>
-        </p:spPr>
-        <p:txBody>
-          <a:bodyPr wrap="none" rtlCol="0">
-            <a:spAutoFit/>
-          </a:bodyPr>
-          <a:lstStyle/>
-          <a:p>
-            <a:r>
-              <a:rPr lang="de-DE" i="1" dirty="0" smtClean="0">
-                <a:latin typeface="Times New Roman" pitchFamily="18" charset="0"/>
-                <a:cs typeface="Times New Roman" pitchFamily="18" charset="0"/>
-              </a:rPr>
-              <a:t>z</a:t>
-            </a:r>
-            <a:endParaRPr lang="de-DE" i="1" dirty="0">
-              <a:latin typeface="Times New Roman" pitchFamily="18" charset="0"/>
-              <a:cs typeface="Times New Roman" pitchFamily="18" charset="0"/>
-            </a:endParaRPr>
-          </a:p>
-        </p:txBody>
-      </p:sp>
-      <p:sp>
-        <p:nvSpPr>
-          <p:cNvPr id="28" name="Textfeld 27"/>
-          <p:cNvSpPr txBox="1"/>
-          <p:nvPr/>
-        </p:nvSpPr>
-        <p:spPr>
-          <a:xfrm>
-            <a:off x="3635896" y="1484784"/>
-            <a:ext cx="522900" cy="369332"/>
-          </a:xfrm>
-          <a:prstGeom prst="rect">
-            <a:avLst/>
-          </a:prstGeom>
-          <a:noFill/>
-        </p:spPr>
-        <p:txBody>
-          <a:bodyPr wrap="none" rtlCol="0">
-            <a:spAutoFit/>
-          </a:bodyPr>
-          <a:lstStyle/>
-          <a:p>
-            <a:r>
-              <a:rPr lang="de-DE" dirty="0" smtClean="0">
-                <a:latin typeface="Arial" pitchFamily="34" charset="0"/>
-                <a:cs typeface="Arial" pitchFamily="34" charset="0"/>
-              </a:rPr>
-              <a:t>|0&gt;</a:t>
-            </a:r>
-            <a:endParaRPr lang="de-DE" dirty="0">
-              <a:latin typeface="Arial" pitchFamily="34" charset="0"/>
-              <a:cs typeface="Arial" pitchFamily="34" charset="0"/>
-            </a:endParaRPr>
-          </a:p>
-        </p:txBody>
-      </p:sp>
-      <p:sp>
-        <p:nvSpPr>
-          <p:cNvPr id="30" name="Textfeld 29"/>
-          <p:cNvSpPr txBox="1"/>
-          <p:nvPr/>
-        </p:nvSpPr>
-        <p:spPr>
-          <a:xfrm>
-            <a:off x="3617052" y="4293096"/>
-            <a:ext cx="522900" cy="369332"/>
-          </a:xfrm>
-          <a:prstGeom prst="rect">
-            <a:avLst/>
-          </a:prstGeom>
-          <a:noFill/>
-        </p:spPr>
-        <p:txBody>
-          <a:bodyPr wrap="none" rtlCol="0">
-            <a:spAutoFit/>
-          </a:bodyPr>
-          <a:lstStyle/>
-          <a:p>
-            <a:r>
-              <a:rPr lang="de-DE" dirty="0" smtClean="0">
-                <a:latin typeface="Arial" pitchFamily="34" charset="0"/>
-                <a:cs typeface="Arial" pitchFamily="34" charset="0"/>
-              </a:rPr>
-              <a:t>|1&gt;</a:t>
-            </a:r>
-            <a:endParaRPr lang="de-DE" dirty="0">
-              <a:latin typeface="Arial" pitchFamily="34" charset="0"/>
-              <a:cs typeface="Arial" pitchFamily="34" charset="0"/>
-            </a:endParaRPr>
-          </a:p>
-        </p:txBody>
-      </p:sp>
+      </p:cxnSp>
     </p:spTree>
   </p:cSld>
   <p:clrMapOvr>

</xml_diff>

<commit_message>
Worked on the conclusions and outlook section. Added missing figure captions and a definition of quantum state fidelity to the introduction.
</commit_message>
<xml_diff>
--- a/material/figures/introduction/bloch_sphere.pptx
+++ b/material/figures/introduction/bloch_sphere.pptx
@@ -290,7 +290,7 @@
             <a:fld id="{CD24382D-258E-48E6-BA37-B81B0A7FCDAE}" type="datetimeFigureOut">
               <a:rPr lang="de-DE" smtClean="0"/>
               <a:pPr/>
-              <a:t>20.08.2012</a:t>
+              <a:t>07.09.2012</a:t>
             </a:fld>
             <a:endParaRPr lang="de-DE"/>
           </a:p>
@@ -457,7 +457,7 @@
             <a:fld id="{CD24382D-258E-48E6-BA37-B81B0A7FCDAE}" type="datetimeFigureOut">
               <a:rPr lang="de-DE" smtClean="0"/>
               <a:pPr/>
-              <a:t>20.08.2012</a:t>
+              <a:t>07.09.2012</a:t>
             </a:fld>
             <a:endParaRPr lang="de-DE"/>
           </a:p>
@@ -634,7 +634,7 @@
             <a:fld id="{CD24382D-258E-48E6-BA37-B81B0A7FCDAE}" type="datetimeFigureOut">
               <a:rPr lang="de-DE" smtClean="0"/>
               <a:pPr/>
-              <a:t>20.08.2012</a:t>
+              <a:t>07.09.2012</a:t>
             </a:fld>
             <a:endParaRPr lang="de-DE"/>
           </a:p>
@@ -801,7 +801,7 @@
             <a:fld id="{CD24382D-258E-48E6-BA37-B81B0A7FCDAE}" type="datetimeFigureOut">
               <a:rPr lang="de-DE" smtClean="0"/>
               <a:pPr/>
-              <a:t>20.08.2012</a:t>
+              <a:t>07.09.2012</a:t>
             </a:fld>
             <a:endParaRPr lang="de-DE"/>
           </a:p>
@@ -1044,7 +1044,7 @@
             <a:fld id="{CD24382D-258E-48E6-BA37-B81B0A7FCDAE}" type="datetimeFigureOut">
               <a:rPr lang="de-DE" smtClean="0"/>
               <a:pPr/>
-              <a:t>20.08.2012</a:t>
+              <a:t>07.09.2012</a:t>
             </a:fld>
             <a:endParaRPr lang="de-DE"/>
           </a:p>
@@ -1329,7 +1329,7 @@
             <a:fld id="{CD24382D-258E-48E6-BA37-B81B0A7FCDAE}" type="datetimeFigureOut">
               <a:rPr lang="de-DE" smtClean="0"/>
               <a:pPr/>
-              <a:t>20.08.2012</a:t>
+              <a:t>07.09.2012</a:t>
             </a:fld>
             <a:endParaRPr lang="de-DE"/>
           </a:p>
@@ -1748,7 +1748,7 @@
             <a:fld id="{CD24382D-258E-48E6-BA37-B81B0A7FCDAE}" type="datetimeFigureOut">
               <a:rPr lang="de-DE" smtClean="0"/>
               <a:pPr/>
-              <a:t>20.08.2012</a:t>
+              <a:t>07.09.2012</a:t>
             </a:fld>
             <a:endParaRPr lang="de-DE"/>
           </a:p>
@@ -1863,7 +1863,7 @@
             <a:fld id="{CD24382D-258E-48E6-BA37-B81B0A7FCDAE}" type="datetimeFigureOut">
               <a:rPr lang="de-DE" smtClean="0"/>
               <a:pPr/>
-              <a:t>20.08.2012</a:t>
+              <a:t>07.09.2012</a:t>
             </a:fld>
             <a:endParaRPr lang="de-DE"/>
           </a:p>
@@ -1955,7 +1955,7 @@
             <a:fld id="{CD24382D-258E-48E6-BA37-B81B0A7FCDAE}" type="datetimeFigureOut">
               <a:rPr lang="de-DE" smtClean="0"/>
               <a:pPr/>
-              <a:t>20.08.2012</a:t>
+              <a:t>07.09.2012</a:t>
             </a:fld>
             <a:endParaRPr lang="de-DE"/>
           </a:p>
@@ -2229,7 +2229,7 @@
             <a:fld id="{CD24382D-258E-48E6-BA37-B81B0A7FCDAE}" type="datetimeFigureOut">
               <a:rPr lang="de-DE" smtClean="0"/>
               <a:pPr/>
-              <a:t>20.08.2012</a:t>
+              <a:t>07.09.2012</a:t>
             </a:fld>
             <a:endParaRPr lang="de-DE"/>
           </a:p>
@@ -2479,7 +2479,7 @@
             <a:fld id="{CD24382D-258E-48E6-BA37-B81B0A7FCDAE}" type="datetimeFigureOut">
               <a:rPr lang="de-DE" smtClean="0"/>
               <a:pPr/>
-              <a:t>20.08.2012</a:t>
+              <a:t>07.09.2012</a:t>
             </a:fld>
             <a:endParaRPr lang="de-DE"/>
           </a:p>
@@ -2689,7 +2689,7 @@
             <a:fld id="{CD24382D-258E-48E6-BA37-B81B0A7FCDAE}" type="datetimeFigureOut">
               <a:rPr lang="de-DE" smtClean="0"/>
               <a:pPr/>
-              <a:t>20.08.2012</a:t>
+              <a:t>07.09.2012</a:t>
             </a:fld>
             <a:endParaRPr lang="de-DE"/>
           </a:p>
@@ -3245,8 +3245,8 @@
             <a:solidFill>
               <a:schemeClr val="tx1"/>
             </a:solidFill>
-            <a:headEnd type="triangle" w="med" len="med"/>
-            <a:tailEnd type="none" w="med" len="med"/>
+            <a:headEnd type="none" w="med" len="med"/>
+            <a:tailEnd type="triangle" w="med" len="med"/>
           </a:ln>
         </p:spPr>
         <p:style>
@@ -3349,7 +3349,7 @@
         </p:nvSpPr>
         <p:spPr>
           <a:xfrm>
-            <a:off x="4238855" y="2339915"/>
+            <a:off x="2759500" y="3571924"/>
             <a:ext cx="386644" cy="369332"/>
           </a:xfrm>
           <a:prstGeom prst="rect">
@@ -3375,7 +3375,7 @@
                 <a:latin typeface="Times New Roman"/>
                 <a:cs typeface="Times New Roman"/>
               </a:rPr>
-              <a:t>y</a:t>
+              <a:t>x</a:t>
             </a:r>
             <a:endParaRPr lang="de-DE" baseline="-25000" dirty="0"/>
           </a:p>
@@ -3389,7 +3389,7 @@
         </p:nvSpPr>
         <p:spPr>
           <a:xfrm>
-            <a:off x="4644008" y="2708920"/>
+            <a:off x="4833428" y="2708920"/>
             <a:ext cx="386644" cy="369332"/>
           </a:xfrm>
           <a:prstGeom prst="rect">
@@ -3415,7 +3415,7 @@
                 <a:latin typeface="Times New Roman"/>
                 <a:cs typeface="Times New Roman"/>
               </a:rPr>
-              <a:t>x</a:t>
+              <a:t>y</a:t>
             </a:r>
             <a:endParaRPr lang="de-DE" baseline="-25000" dirty="0"/>
           </a:p>
@@ -3428,8 +3428,8 @@
           <p:nvPr/>
         </p:nvSpPr>
         <p:spPr>
-          <a:xfrm>
-            <a:off x="4788024" y="3068960"/>
+          <a:xfrm rot="10800000" flipH="1">
+            <a:off x="4932040" y="3068960"/>
             <a:ext cx="144016" cy="288032"/>
           </a:xfrm>
           <a:prstGeom prst="arc">
@@ -3476,9 +3476,9 @@
           <p:nvPr/>
         </p:nvSpPr>
         <p:spPr>
-          <a:xfrm flipH="1">
-            <a:off x="4077197" y="2429565"/>
-            <a:ext cx="216024" cy="216024"/>
+          <a:xfrm rot="10800000">
+            <a:off x="3068032" y="3717032"/>
+            <a:ext cx="144016" cy="216024"/>
           </a:xfrm>
           <a:prstGeom prst="arc">
             <a:avLst>
@@ -4019,7 +4019,7 @@
         </p:nvSpPr>
         <p:spPr>
           <a:xfrm>
-            <a:off x="5076830" y="2915652"/>
+            <a:off x="5200346" y="2840636"/>
             <a:ext cx="287258" cy="369332"/>
           </a:xfrm>
           <a:prstGeom prst="rect">
@@ -4055,7 +4055,7 @@
         </p:nvSpPr>
         <p:spPr>
           <a:xfrm>
-            <a:off x="2916590" y="3573016"/>
+            <a:off x="4139952" y="2335488"/>
             <a:ext cx="287258" cy="369332"/>
           </a:xfrm>
           <a:prstGeom prst="rect">
@@ -4070,12 +4070,16 @@
           <a:lstStyle/>
           <a:p>
             <a:r>
-              <a:rPr lang="de-DE" i="1" dirty="0">
+              <a:rPr lang="de-DE" i="1" dirty="0" smtClean="0">
                 <a:latin typeface="Times New Roman" pitchFamily="18" charset="0"/>
                 <a:cs typeface="Times New Roman" pitchFamily="18" charset="0"/>
               </a:rPr>
               <a:t>y</a:t>
             </a:r>
+            <a:endParaRPr lang="de-DE" i="1" dirty="0">
+              <a:latin typeface="Times New Roman" pitchFamily="18" charset="0"/>
+              <a:cs typeface="Times New Roman" pitchFamily="18" charset="0"/>
+            </a:endParaRPr>
           </a:p>
         </p:txBody>
       </p:sp>

</xml_diff>